<commit_message>
pshing ppt and transformer code
</commit_message>
<xml_diff>
--- a/reports/Phase 1/Phase1_47.pptx
+++ b/reports/Phase 1/Phase1_47.pptx
@@ -6,7 +6,7 @@
     <p:sldMasterId id="2147483660" r:id="rId2"/>
   </p:sldMasterIdLst>
   <p:notesMasterIdLst>
-    <p:notesMasterId r:id="rId18"/>
+    <p:notesMasterId r:id="rId20"/>
   </p:notesMasterIdLst>
   <p:sldIdLst>
     <p:sldId id="261" r:id="rId3"/>
@@ -24,6 +24,8 @@
     <p:sldId id="1108" r:id="rId15"/>
     <p:sldId id="1109" r:id="rId16"/>
     <p:sldId id="1110" r:id="rId17"/>
+    <p:sldId id="1111" r:id="rId18"/>
+    <p:sldId id="1112" r:id="rId19"/>
   </p:sldIdLst>
   <p:sldSz cx="12192000" cy="6858000"/>
   <p:notesSz cx="6858000" cy="9144000"/>
@@ -220,7 +222,7 @@
           <a:p>
             <a:fld id="{18684B3B-E091-4218-B734-7F09C964D9E9}" type="datetimeFigureOut">
               <a:rPr lang="en-IN" smtClean="0"/>
-              <a:t>19-12-2025</a:t>
+              <a:t>20-12-2025</a:t>
             </a:fld>
             <a:endParaRPr lang="en-IN"/>
           </a:p>
@@ -8756,17 +8758,7 @@
                 <a:latin typeface="Segoe UI"/>
                 <a:cs typeface="Segoe UI"/>
               </a:rPr>
-              <a:t>A Lightweight Health Risk Analysis App for the Elderly using </a:t>
-            </a:r>
-            <a:r>
-              <a:rPr lang="en-GB" sz="4400" b="1" dirty="0" err="1">
-                <a:solidFill>
-                  <a:schemeClr val="bg1"/>
-                </a:solidFill>
-                <a:latin typeface="Segoe UI"/>
-                <a:cs typeface="Segoe UI"/>
-              </a:rPr>
-              <a:t>SleepStudies</a:t>
+              <a:t>A Lightweight Health Risk Analysis App for the Elderly using Sleep Studies</a:t>
             </a:r>
             <a:endParaRPr lang="en-US" sz="4000" b="1" dirty="0">
               <a:solidFill>
@@ -8945,18 +8937,18 @@
       </p:grpSpPr>
       <p:sp>
         <p:nvSpPr>
-          <p:cNvPr id="2" name="Content Placeholder 1">
-            <a:extLst>
-              <a:ext uri="{FF2B5EF4-FFF2-40B4-BE49-F238E27FC236}">
-                <a16:creationId xmlns:a16="http://schemas.microsoft.com/office/drawing/2014/main" id="{270C52D7-367C-FEEA-A380-97D1671D90E4}"/>
-              </a:ext>
-            </a:extLst>
-          </p:cNvPr>
-          <p:cNvSpPr>
-            <a:spLocks noGrp="1"/>
-          </p:cNvSpPr>
-          <p:nvPr>
-            <p:ph idx="1"/>
+          <p:cNvPr id="3" name="Title 2">
+            <a:extLst>
+              <a:ext uri="{FF2B5EF4-FFF2-40B4-BE49-F238E27FC236}">
+                <a16:creationId xmlns:a16="http://schemas.microsoft.com/office/drawing/2014/main" id="{9477AD15-9EE7-767F-53DC-82BD6CF28AC6}"/>
+              </a:ext>
+            </a:extLst>
+          </p:cNvPr>
+          <p:cNvSpPr>
+            <a:spLocks noGrp="1"/>
+          </p:cNvSpPr>
+          <p:nvPr>
+            <p:ph type="title"/>
           </p:nvPr>
         </p:nvSpPr>
         <p:spPr/>
@@ -8964,34 +8956,9 @@
           <a:bodyPr/>
           <a:lstStyle/>
           <a:p>
-            <a:endParaRPr lang="en-AE" dirty="0"/>
-          </a:p>
-        </p:txBody>
-      </p:sp>
-      <p:sp>
-        <p:nvSpPr>
-          <p:cNvPr id="3" name="Title 2">
-            <a:extLst>
-              <a:ext uri="{FF2B5EF4-FFF2-40B4-BE49-F238E27FC236}">
-                <a16:creationId xmlns:a16="http://schemas.microsoft.com/office/drawing/2014/main" id="{9477AD15-9EE7-767F-53DC-82BD6CF28AC6}"/>
-              </a:ext>
-            </a:extLst>
-          </p:cNvPr>
-          <p:cNvSpPr>
-            <a:spLocks noGrp="1"/>
-          </p:cNvSpPr>
-          <p:nvPr>
-            <p:ph type="title"/>
-          </p:nvPr>
-        </p:nvSpPr>
-        <p:spPr/>
-        <p:txBody>
-          <a:bodyPr/>
-          <a:lstStyle/>
-          <a:p>
             <a:r>
               <a:rPr lang="en-GB" dirty="0"/>
-              <a:t>Design</a:t>
+              <a:t>Optimal light-weight Architecture</a:t>
             </a:r>
             <a:endParaRPr lang="en-AE" dirty="0"/>
           </a:p>
@@ -9024,6 +8991,148 @@
               <a:t>10</a:t>
             </a:fld>
             <a:endParaRPr lang="en-US"/>
+          </a:p>
+        </p:txBody>
+      </p:sp>
+      <p:pic>
+        <p:nvPicPr>
+          <p:cNvPr id="6" name="Picture 5" descr="A diagram of a pool&#10;&#10;AI-generated content may be incorrect.">
+            <a:extLst>
+              <a:ext uri="{FF2B5EF4-FFF2-40B4-BE49-F238E27FC236}">
+                <a16:creationId xmlns:a16="http://schemas.microsoft.com/office/drawing/2014/main" id="{D8C7F311-ABDB-350A-1B3A-321F8A699ACD}"/>
+              </a:ext>
+            </a:extLst>
+          </p:cNvPr>
+          <p:cNvPicPr>
+            <a:picLocks noChangeAspect="1"/>
+          </p:cNvPicPr>
+          <p:nvPr/>
+        </p:nvPicPr>
+        <p:blipFill>
+          <a:blip r:embed="rId2"/>
+          <a:stretch>
+            <a:fillRect/>
+          </a:stretch>
+        </p:blipFill>
+        <p:spPr>
+          <a:xfrm>
+            <a:off x="7934025" y="732182"/>
+            <a:ext cx="3686476" cy="5393636"/>
+          </a:xfrm>
+          <a:prstGeom prst="rect">
+            <a:avLst/>
+          </a:prstGeom>
+        </p:spPr>
+      </p:pic>
+      <p:sp>
+        <p:nvSpPr>
+          <p:cNvPr id="10" name="TextBox 9">
+            <a:extLst>
+              <a:ext uri="{FF2B5EF4-FFF2-40B4-BE49-F238E27FC236}">
+                <a16:creationId xmlns:a16="http://schemas.microsoft.com/office/drawing/2014/main" id="{DA105F10-7E6F-4346-0389-C75D142733B7}"/>
+              </a:ext>
+            </a:extLst>
+          </p:cNvPr>
+          <p:cNvSpPr txBox="1"/>
+          <p:nvPr/>
+        </p:nvSpPr>
+        <p:spPr>
+          <a:xfrm>
+            <a:off x="507999" y="936171"/>
+            <a:ext cx="7426025" cy="4893647"/>
+          </a:xfrm>
+          <a:prstGeom prst="rect">
+            <a:avLst/>
+          </a:prstGeom>
+          <a:noFill/>
+        </p:spPr>
+        <p:txBody>
+          <a:bodyPr wrap="square" rtlCol="0">
+            <a:spAutoFit/>
+          </a:bodyPr>
+          <a:lstStyle/>
+          <a:p>
+            <a:pPr lvl="0" eaLnBrk="0" fontAlgn="base" hangingPunct="0">
+              <a:spcBef>
+                <a:spcPct val="0"/>
+              </a:spcBef>
+              <a:spcAft>
+                <a:spcPct val="0"/>
+              </a:spcAft>
+              <a:buFontTx/>
+              <a:buChar char="•"/>
+            </a:pPr>
+            <a:r>
+              <a:rPr lang="en-GB" sz="2600" dirty="0">
+                <a:latin typeface="Georgia" panose="02040502050405020303" pitchFamily="18" charset="0"/>
+              </a:rPr>
+              <a:t> </a:t>
+            </a:r>
+            <a:r>
+              <a:rPr lang="en-US" altLang="en-US" sz="2600" b="1" dirty="0">
+                <a:latin typeface="Georgia" panose="02040502050405020303" pitchFamily="18" charset="0"/>
+              </a:rPr>
+              <a:t>Multi-branch feature extraction:</a:t>
+            </a:r>
+            <a:r>
+              <a:rPr lang="en-US" altLang="en-US" sz="2600" dirty="0">
+                <a:latin typeface="Georgia" panose="02040502050405020303" pitchFamily="18" charset="0"/>
+              </a:rPr>
+              <a:t> The NAS-designed block combines dilated convolutions, separable convolutions, and pooling to capture features at multiple receptive fields.</a:t>
+            </a:r>
+          </a:p>
+          <a:p>
+            <a:pPr lvl="0" eaLnBrk="0" fontAlgn="base" hangingPunct="0">
+              <a:spcBef>
+                <a:spcPct val="0"/>
+              </a:spcBef>
+              <a:spcAft>
+                <a:spcPct val="0"/>
+              </a:spcAft>
+              <a:buFontTx/>
+              <a:buChar char="•"/>
+            </a:pPr>
+            <a:r>
+              <a:rPr lang="en-US" altLang="en-US" sz="2600" b="1" dirty="0">
+                <a:latin typeface="Georgia" panose="02040502050405020303" pitchFamily="18" charset="0"/>
+              </a:rPr>
+              <a:t>Progressive fusion:</a:t>
+            </a:r>
+            <a:r>
+              <a:rPr lang="en-US" altLang="en-US" sz="2600" dirty="0">
+                <a:latin typeface="Georgia" panose="02040502050405020303" pitchFamily="18" charset="0"/>
+              </a:rPr>
+              <a:t> Intermediate features are repeatedly concatenated, enabling richer representation learning across stages.</a:t>
+            </a:r>
+          </a:p>
+          <a:p>
+            <a:pPr lvl="0" eaLnBrk="0" fontAlgn="base" hangingPunct="0">
+              <a:spcBef>
+                <a:spcPct val="0"/>
+              </a:spcBef>
+              <a:spcAft>
+                <a:spcPct val="0"/>
+              </a:spcAft>
+              <a:buFontTx/>
+              <a:buChar char="•"/>
+            </a:pPr>
+            <a:r>
+              <a:rPr lang="en-US" altLang="en-US" sz="2600" b="1" dirty="0">
+                <a:latin typeface="Georgia" panose="02040502050405020303" pitchFamily="18" charset="0"/>
+              </a:rPr>
+              <a:t>Attention-enhanced output:</a:t>
+            </a:r>
+            <a:r>
+              <a:rPr lang="en-US" altLang="en-US" sz="2600" dirty="0">
+                <a:latin typeface="Georgia" panose="02040502050405020303" pitchFamily="18" charset="0"/>
+              </a:rPr>
+              <a:t> Stacked attention modules refine important features before final aggregation, improving focus on salient patterns.</a:t>
+            </a:r>
+          </a:p>
+          <a:p>
+            <a:endParaRPr lang="en-AE" sz="2600" dirty="0">
+              <a:latin typeface="Georgia" panose="02040502050405020303" pitchFamily="18" charset="0"/>
+            </a:endParaRPr>
           </a:p>
         </p:txBody>
       </p:sp>
@@ -9324,6 +9433,80 @@
           <a:bodyPr/>
           <a:lstStyle/>
           <a:p>
+            <a:r>
+              <a:rPr lang="de-DE" b="1" dirty="0"/>
+              <a:t>1. Classification Performance (Multi-label, Imbalanced Data)</a:t>
+            </a:r>
+            <a:endParaRPr lang="de-DE" dirty="0"/>
+          </a:p>
+          <a:p>
+            <a:r>
+              <a:rPr lang="de-DE" sz="2500" b="1" dirty="0"/>
+              <a:t>ROC Curves:</a:t>
+            </a:r>
+            <a:r>
+              <a:rPr lang="de-DE" sz="2500" dirty="0"/>
+              <a:t> Measure diagnostic discrimination across thresholds</a:t>
+            </a:r>
+          </a:p>
+          <a:p>
+            <a:r>
+              <a:rPr lang="de-DE" sz="2500" b="1" dirty="0"/>
+              <a:t>Precision–Recall Curves:</a:t>
+            </a:r>
+            <a:r>
+              <a:rPr lang="de-DE" sz="2500" dirty="0"/>
+              <a:t> Emphasize performance on rare disease conditions</a:t>
+            </a:r>
+          </a:p>
+          <a:p>
+            <a:r>
+              <a:rPr lang="de-DE" sz="2500" b="1" dirty="0"/>
+              <a:t>Confusion Matrices:</a:t>
+            </a:r>
+            <a:r>
+              <a:rPr lang="de-DE" sz="2500" dirty="0"/>
+              <a:t> TP, TN, FP, FN analysis per disease (D = 20)</a:t>
+            </a:r>
+          </a:p>
+          <a:p>
+            <a:r>
+              <a:rPr lang="de-DE" b="1" dirty="0"/>
+              <a:t>2. Computational Efficiency (Lightweight Constraints)</a:t>
+            </a:r>
+            <a:endParaRPr lang="de-DE" dirty="0"/>
+          </a:p>
+          <a:p>
+            <a:r>
+              <a:rPr lang="de-DE" sz="2600" b="1" dirty="0"/>
+              <a:t>FLOPs:</a:t>
+            </a:r>
+            <a:r>
+              <a:rPr lang="de-DE" sz="2600" dirty="0"/>
+              <a:t> Forward-pass computational complexity</a:t>
+            </a:r>
+          </a:p>
+          <a:p>
+            <a:r>
+              <a:rPr lang="de-DE" sz="2600" b="1" dirty="0"/>
+              <a:t>MACs:</a:t>
+            </a:r>
+            <a:r>
+              <a:rPr lang="de-DE" sz="2600" dirty="0"/>
+              <a:t> Arithmetic operation cost</a:t>
+            </a:r>
+          </a:p>
+          <a:p>
+            <a:r>
+              <a:rPr lang="de-DE" sz="2600" b="1" dirty="0"/>
+              <a:t>Parameter Count:</a:t>
+            </a:r>
+            <a:r>
+              <a:rPr lang="de-DE" sz="2600" dirty="0"/>
+              <a:t> Trainable weights (regularized during NAS)</a:t>
+            </a:r>
+          </a:p>
+          <a:p>
             <a:endParaRPr lang="en-AE" dirty="0"/>
           </a:p>
         </p:txBody>
@@ -9640,6 +9823,246 @@
 </p:sld>
 </file>
 
+<file path=ppt/slides/slide16.xml><?xml version="1.0" encoding="utf-8"?>
+<p:sld xmlns:a="http://schemas.openxmlformats.org/drawingml/2006/main" xmlns:r="http://schemas.openxmlformats.org/officeDocument/2006/relationships" xmlns:p="http://schemas.openxmlformats.org/presentationml/2006/main">
+  <p:cSld>
+    <p:spTree>
+      <p:nvGrpSpPr>
+        <p:cNvPr id="1" name="">
+          <a:extLst>
+            <a:ext uri="{FF2B5EF4-FFF2-40B4-BE49-F238E27FC236}">
+              <a16:creationId xmlns:a16="http://schemas.microsoft.com/office/drawing/2014/main" id="{5824D284-3C75-E532-4D97-4F8752D9CD82}"/>
+            </a:ext>
+          </a:extLst>
+        </p:cNvPr>
+        <p:cNvGrpSpPr/>
+        <p:nvPr/>
+      </p:nvGrpSpPr>
+      <p:grpSpPr>
+        <a:xfrm>
+          <a:off x="0" y="0"/>
+          <a:ext cx="0" cy="0"/>
+          <a:chOff x="0" y="0"/>
+          <a:chExt cx="0" cy="0"/>
+        </a:xfrm>
+      </p:grpSpPr>
+      <p:sp>
+        <p:nvSpPr>
+          <p:cNvPr id="2" name="Content Placeholder 1">
+            <a:extLst>
+              <a:ext uri="{FF2B5EF4-FFF2-40B4-BE49-F238E27FC236}">
+                <a16:creationId xmlns:a16="http://schemas.microsoft.com/office/drawing/2014/main" id="{A4BC72E8-5E8E-BC3A-69F8-D7CEB45C5EB0}"/>
+              </a:ext>
+            </a:extLst>
+          </p:cNvPr>
+          <p:cNvSpPr>
+            <a:spLocks noGrp="1"/>
+          </p:cNvSpPr>
+          <p:nvPr>
+            <p:ph idx="1"/>
+          </p:nvPr>
+        </p:nvSpPr>
+        <p:spPr/>
+        <p:txBody>
+          <a:bodyPr/>
+          <a:lstStyle/>
+          <a:p>
+            <a:endParaRPr lang="en-AE" dirty="0"/>
+          </a:p>
+        </p:txBody>
+      </p:sp>
+      <p:sp>
+        <p:nvSpPr>
+          <p:cNvPr id="3" name="Title 2">
+            <a:extLst>
+              <a:ext uri="{FF2B5EF4-FFF2-40B4-BE49-F238E27FC236}">
+                <a16:creationId xmlns:a16="http://schemas.microsoft.com/office/drawing/2014/main" id="{0FF0527A-4332-6251-7B62-47558179F0F1}"/>
+              </a:ext>
+            </a:extLst>
+          </p:cNvPr>
+          <p:cNvSpPr>
+            <a:spLocks noGrp="1"/>
+          </p:cNvSpPr>
+          <p:nvPr>
+            <p:ph type="title"/>
+          </p:nvPr>
+        </p:nvSpPr>
+        <p:spPr/>
+        <p:txBody>
+          <a:bodyPr/>
+          <a:lstStyle/>
+          <a:p>
+            <a:r>
+              <a:rPr lang="en-GB" dirty="0"/>
+              <a:t>Phase 2 Plan</a:t>
+            </a:r>
+            <a:endParaRPr lang="en-AE" dirty="0"/>
+          </a:p>
+        </p:txBody>
+      </p:sp>
+      <p:sp>
+        <p:nvSpPr>
+          <p:cNvPr id="4" name="Slide Number Placeholder 3">
+            <a:extLst>
+              <a:ext uri="{FF2B5EF4-FFF2-40B4-BE49-F238E27FC236}">
+                <a16:creationId xmlns:a16="http://schemas.microsoft.com/office/drawing/2014/main" id="{9463ADC9-9C84-8D62-508B-5529A868D3F1}"/>
+              </a:ext>
+            </a:extLst>
+          </p:cNvPr>
+          <p:cNvSpPr>
+            <a:spLocks noGrp="1"/>
+          </p:cNvSpPr>
+          <p:nvPr>
+            <p:ph type="sldNum" sz="quarter" idx="12"/>
+          </p:nvPr>
+        </p:nvSpPr>
+        <p:spPr/>
+        <p:txBody>
+          <a:bodyPr/>
+          <a:lstStyle/>
+          <a:p>
+            <a:fld id="{330EA680-D336-4FF7-8B7A-9848BB0A1C32}" type="slidenum">
+              <a:rPr lang="en-US" smtClean="0"/>
+              <a:pPr/>
+              <a:t>16</a:t>
+            </a:fld>
+            <a:endParaRPr lang="en-US"/>
+          </a:p>
+        </p:txBody>
+      </p:sp>
+    </p:spTree>
+    <p:extLst>
+      <p:ext uri="{BB962C8B-B14F-4D97-AF65-F5344CB8AC3E}">
+        <p14:creationId xmlns:p14="http://schemas.microsoft.com/office/powerpoint/2010/main" val="115937501"/>
+      </p:ext>
+    </p:extLst>
+  </p:cSld>
+  <p:clrMapOvr>
+    <a:masterClrMapping/>
+  </p:clrMapOvr>
+</p:sld>
+</file>
+
+<file path=ppt/slides/slide17.xml><?xml version="1.0" encoding="utf-8"?>
+<p:sld xmlns:a="http://schemas.openxmlformats.org/drawingml/2006/main" xmlns:r="http://schemas.openxmlformats.org/officeDocument/2006/relationships" xmlns:p="http://schemas.openxmlformats.org/presentationml/2006/main">
+  <p:cSld>
+    <p:spTree>
+      <p:nvGrpSpPr>
+        <p:cNvPr id="1" name="">
+          <a:extLst>
+            <a:ext uri="{FF2B5EF4-FFF2-40B4-BE49-F238E27FC236}">
+              <a16:creationId xmlns:a16="http://schemas.microsoft.com/office/drawing/2014/main" id="{8B31D222-B7FB-70A1-C9C7-D1DB54D9F244}"/>
+            </a:ext>
+          </a:extLst>
+        </p:cNvPr>
+        <p:cNvGrpSpPr/>
+        <p:nvPr/>
+      </p:nvGrpSpPr>
+      <p:grpSpPr>
+        <a:xfrm>
+          <a:off x="0" y="0"/>
+          <a:ext cx="0" cy="0"/>
+          <a:chOff x="0" y="0"/>
+          <a:chExt cx="0" cy="0"/>
+        </a:xfrm>
+      </p:grpSpPr>
+      <p:sp>
+        <p:nvSpPr>
+          <p:cNvPr id="2" name="Content Placeholder 1">
+            <a:extLst>
+              <a:ext uri="{FF2B5EF4-FFF2-40B4-BE49-F238E27FC236}">
+                <a16:creationId xmlns:a16="http://schemas.microsoft.com/office/drawing/2014/main" id="{28CFC4A1-0418-D93A-CEDD-A6C7F31C11E1}"/>
+              </a:ext>
+            </a:extLst>
+          </p:cNvPr>
+          <p:cNvSpPr>
+            <a:spLocks noGrp="1"/>
+          </p:cNvSpPr>
+          <p:nvPr>
+            <p:ph idx="1"/>
+          </p:nvPr>
+        </p:nvSpPr>
+        <p:spPr/>
+        <p:txBody>
+          <a:bodyPr/>
+          <a:lstStyle/>
+          <a:p>
+            <a:endParaRPr lang="en-AE" dirty="0"/>
+          </a:p>
+        </p:txBody>
+      </p:sp>
+      <p:sp>
+        <p:nvSpPr>
+          <p:cNvPr id="3" name="Title 2">
+            <a:extLst>
+              <a:ext uri="{FF2B5EF4-FFF2-40B4-BE49-F238E27FC236}">
+                <a16:creationId xmlns:a16="http://schemas.microsoft.com/office/drawing/2014/main" id="{57EBB3AF-8C3E-EF4C-709E-98C4F2A4B774}"/>
+              </a:ext>
+            </a:extLst>
+          </p:cNvPr>
+          <p:cNvSpPr>
+            <a:spLocks noGrp="1"/>
+          </p:cNvSpPr>
+          <p:nvPr>
+            <p:ph type="title"/>
+          </p:nvPr>
+        </p:nvSpPr>
+        <p:spPr/>
+        <p:txBody>
+          <a:bodyPr/>
+          <a:lstStyle/>
+          <a:p>
+            <a:r>
+              <a:rPr lang="en-GB" dirty="0"/>
+              <a:t>References</a:t>
+            </a:r>
+            <a:endParaRPr lang="en-AE" dirty="0"/>
+          </a:p>
+        </p:txBody>
+      </p:sp>
+      <p:sp>
+        <p:nvSpPr>
+          <p:cNvPr id="4" name="Slide Number Placeholder 3">
+            <a:extLst>
+              <a:ext uri="{FF2B5EF4-FFF2-40B4-BE49-F238E27FC236}">
+                <a16:creationId xmlns:a16="http://schemas.microsoft.com/office/drawing/2014/main" id="{E51294BA-4928-FACF-C9D9-C83679A7A795}"/>
+              </a:ext>
+            </a:extLst>
+          </p:cNvPr>
+          <p:cNvSpPr>
+            <a:spLocks noGrp="1"/>
+          </p:cNvSpPr>
+          <p:nvPr>
+            <p:ph type="sldNum" sz="quarter" idx="12"/>
+          </p:nvPr>
+        </p:nvSpPr>
+        <p:spPr/>
+        <p:txBody>
+          <a:bodyPr/>
+          <a:lstStyle/>
+          <a:p>
+            <a:fld id="{330EA680-D336-4FF7-8B7A-9848BB0A1C32}" type="slidenum">
+              <a:rPr lang="en-US" smtClean="0"/>
+              <a:pPr/>
+              <a:t>17</a:t>
+            </a:fld>
+            <a:endParaRPr lang="en-US"/>
+          </a:p>
+        </p:txBody>
+      </p:sp>
+    </p:spTree>
+    <p:extLst>
+      <p:ext uri="{BB962C8B-B14F-4D97-AF65-F5344CB8AC3E}">
+        <p14:creationId xmlns:p14="http://schemas.microsoft.com/office/powerpoint/2010/main" val="1453087159"/>
+      </p:ext>
+    </p:extLst>
+  </p:cSld>
+  <p:clrMapOvr>
+    <a:masterClrMapping/>
+  </p:clrMapOvr>
+</p:sld>
+</file>
+
 <file path=ppt/slides/slide2.xml><?xml version="1.0" encoding="utf-8"?>
 <p:sld xmlns:a="http://schemas.openxmlformats.org/drawingml/2006/main" xmlns:r="http://schemas.openxmlformats.org/officeDocument/2006/relationships" xmlns:p="http://schemas.openxmlformats.org/presentationml/2006/main">
   <p:cSld>
@@ -10066,13 +10489,13 @@
               <a:rPr lang="en-US" b="1" dirty="0">
                 <a:latin typeface="Calisto MT" panose="02040603050505030304" pitchFamily="18" charset="0"/>
               </a:rPr>
-              <a:t>increasing chronic disease </a:t>
+              <a:t>increasing risk of chronic diseases</a:t>
             </a:r>
             <a:r>
               <a:rPr lang="en-US" dirty="0">
                 <a:latin typeface="Calisto MT" panose="02040603050505030304" pitchFamily="18" charset="0"/>
               </a:rPr>
-              <a:t>burdens.</a:t>
+              <a:t>.</a:t>
             </a:r>
             <a:endParaRPr lang="en-IN" dirty="0">
               <a:latin typeface="Calisto MT" panose="02040603050505030304" pitchFamily="18" charset="0"/>
@@ -10230,19 +10653,19 @@
               <a:rPr lang="en-US" b="1" dirty="0">
                 <a:latin typeface="Calisto MT" panose="02040603050505030304" pitchFamily="18" charset="0"/>
               </a:rPr>
-              <a:t>Early detection </a:t>
+              <a:t>Automated system </a:t>
             </a:r>
             <a:r>
               <a:rPr lang="en-US" dirty="0">
                 <a:latin typeface="Calisto MT" panose="02040603050505030304" pitchFamily="18" charset="0"/>
               </a:rPr>
-              <a:t>through</a:t>
+              <a:t>using </a:t>
             </a:r>
             <a:r>
               <a:rPr lang="en-US" b="1" dirty="0">
                 <a:latin typeface="Calisto MT" panose="02040603050505030304" pitchFamily="18" charset="0"/>
               </a:rPr>
-              <a:t> sleep analysis </a:t>
+              <a:t>sleep analysis </a:t>
             </a:r>
             <a:r>
               <a:rPr lang="en-US" dirty="0">
@@ -10385,26 +10808,35 @@
         <p:spPr/>
         <p:txBody>
           <a:bodyPr vert="horz" lIns="91440" tIns="45720" rIns="91440" bIns="45720" rtlCol="0" anchor="t">
-            <a:normAutofit/>
+            <a:normAutofit fontScale="92500" lnSpcReduction="20000"/>
           </a:bodyPr>
           <a:lstStyle/>
           <a:p>
             <a:r>
               <a:rPr lang="en-GB" dirty="0"/>
-              <a:t>Manual PSG analysis is time-consuming, expensive, and inaccessible in resource-limited regions, limiting early health risk detection for elderly populations.</a:t>
+              <a:t>The​‍​‌‍​‍‌ demand for an automated health risk detection system for elderly people is quite high. Studies have shown that sleep data is very informative regarding health conditions. In fact, health-risks have been associated with sleep-related data.</a:t>
             </a:r>
           </a:p>
           <a:p>
             <a:r>
               <a:rPr lang="en-GB" dirty="0"/>
-              <a:t>Existing AI models for PSG analysis are computationally heavy and unsuitable for deployment on low-end devices, preventing practical implementation where it's needed most.</a:t>
+              <a:t>A manual PSG analysis requires a lot of time, is costly, and not available in less developed regions, resulting in a lack of early health risk detection for elderly populations.</a:t>
             </a:r>
           </a:p>
           <a:p>
             <a:r>
               <a:rPr lang="en-GB" dirty="0"/>
-              <a:t>There is a need for a lightweight, efficient framework that can reliably assess cardiac, respiratory, and mental health risks while remaining deployable in constrained healthcare environments.</a:t>
-            </a:r>
+              <a:t>AI models available for PSG analysis today are very demanding in terms of computation and therefore cannot be deployed on low-end devices. This means that they are not suitable for practical implementation in the areas where they are needed the most.</a:t>
+            </a:r>
+          </a:p>
+          <a:p>
+            <a:r>
+              <a:rPr lang="en-GB" dirty="0"/>
+              <a:t>We need a light, highly efficient and accurate model for assessing cardiac, respiratory, and mental health risks, yet such a model should also be deployable in a limited healthcare ​‍​‌‍​‍‌setting.</a:t>
+            </a:r>
+          </a:p>
+          <a:p>
+            <a:endParaRPr lang="en-GB" dirty="0"/>
           </a:p>
         </p:txBody>
       </p:sp>
@@ -10566,34 +10998,31 @@
           </a:bodyPr>
           <a:lstStyle/>
           <a:p>
+            <a:r>
+              <a:rPr lang="en-GB" dirty="0"/>
+              <a:t>Design​‍​‌‍​‍‌ an efficient network that is easy to be installed on a low-end hardware and can contribute to green AI.</a:t>
+            </a:r>
+          </a:p>
+          <a:p>
+            <a:r>
+              <a:rPr lang="en-GB" dirty="0"/>
+              <a:t>Extend the representation of the population by unifying various datasets from different groups of people.</a:t>
+            </a:r>
+          </a:p>
+          <a:p>
+            <a:r>
+              <a:rPr lang="en-GB" dirty="0"/>
+              <a:t>Offer disease risk profiles especially for those which are under the spotlight of the society such as mental disorders where diagnosis is considered shameful in the Indian community.</a:t>
+            </a:r>
+          </a:p>
+          <a:p>
+            <a:r>
+              <a:rPr lang="en-GB" dirty="0"/>
+              <a:t>Try different search strategies for NAS such as DARTS, RL, Genetic/Hierarchical, Random ​‍​‌‍​‍‌search.</a:t>
+            </a:r>
+          </a:p>
+          <a:p>
             <a:pPr fontAlgn="base"/>
-            <a:r>
-              <a:rPr lang="en-GB" dirty="0"/>
-              <a:t>Generate an lightweight architecture to deploy on low-end systems and to promote green AI.</a:t>
-            </a:r>
-          </a:p>
-          <a:p>
-            <a:pPr fontAlgn="base"/>
-            <a:r>
-              <a:rPr lang="en-GB" dirty="0"/>
-              <a:t>Generalize the population representation by harmonizing multiple datasets from different cohorts.</a:t>
-            </a:r>
-          </a:p>
-          <a:p>
-            <a:pPr fontAlgn="base"/>
-            <a:r>
-              <a:rPr lang="en-GB" dirty="0"/>
-              <a:t>Provide risk profiles for under represented ailments such as mental disorders which has a negative perception or social stigma for diagnosing in the Indian community.</a:t>
-            </a:r>
-          </a:p>
-          <a:p>
-            <a:pPr fontAlgn="base"/>
-            <a:r>
-              <a:rPr lang="en-GB" dirty="0"/>
-              <a:t>Experimentation between various search strategies for NAS such as DARTS, RL, Genetic/Hierarchical, Random search.</a:t>
-            </a:r>
-          </a:p>
-          <a:p>
             <a:endParaRPr lang="en-AE" dirty="0"/>
           </a:p>
         </p:txBody>
@@ -10729,31 +11158,6 @@
       </p:grpSpPr>
       <p:sp>
         <p:nvSpPr>
-          <p:cNvPr id="2" name="Content Placeholder 1">
-            <a:extLst>
-              <a:ext uri="{FF2B5EF4-FFF2-40B4-BE49-F238E27FC236}">
-                <a16:creationId xmlns:a16="http://schemas.microsoft.com/office/drawing/2014/main" id="{6DA44B9F-47AA-AB65-0C9C-CCF9FD2EB02D}"/>
-              </a:ext>
-            </a:extLst>
-          </p:cNvPr>
-          <p:cNvSpPr>
-            <a:spLocks noGrp="1"/>
-          </p:cNvSpPr>
-          <p:nvPr>
-            <p:ph idx="1"/>
-          </p:nvPr>
-        </p:nvSpPr>
-        <p:spPr/>
-        <p:txBody>
-          <a:bodyPr/>
-          <a:lstStyle/>
-          <a:p>
-            <a:endParaRPr lang="en-AE" dirty="0"/>
-          </a:p>
-        </p:txBody>
-      </p:sp>
-      <p:sp>
-        <p:nvSpPr>
           <p:cNvPr id="3" name="Title 2">
             <a:extLst>
               <a:ext uri="{FF2B5EF4-FFF2-40B4-BE49-F238E27FC236}">
@@ -10811,6 +11215,36 @@
           </a:p>
         </p:txBody>
       </p:sp>
+      <p:pic>
+        <p:nvPicPr>
+          <p:cNvPr id="5" name="Picture 4" descr="A table of information&#10;&#10;AI-generated content may be incorrect.">
+            <a:extLst>
+              <a:ext uri="{FF2B5EF4-FFF2-40B4-BE49-F238E27FC236}">
+                <a16:creationId xmlns:a16="http://schemas.microsoft.com/office/drawing/2014/main" id="{0B5EABE5-6DC9-D92D-3684-3B5FC84A1A94}"/>
+              </a:ext>
+            </a:extLst>
+          </p:cNvPr>
+          <p:cNvPicPr>
+            <a:picLocks noChangeAspect="1"/>
+          </p:cNvPicPr>
+          <p:nvPr/>
+        </p:nvPicPr>
+        <p:blipFill>
+          <a:blip r:embed="rId2"/>
+          <a:stretch>
+            <a:fillRect/>
+          </a:stretch>
+        </p:blipFill>
+        <p:spPr>
+          <a:xfrm>
+            <a:off x="2495227" y="1021937"/>
+            <a:ext cx="7811146" cy="5203040"/>
+          </a:xfrm>
+          <a:prstGeom prst="rect">
+            <a:avLst/>
+          </a:prstGeom>
+        </p:spPr>
+      </p:pic>
     </p:spTree>
     <p:extLst>
       <p:ext uri="{BB962C8B-B14F-4D97-AF65-F5344CB8AC3E}">
@@ -10849,31 +11283,6 @@
       </p:grpSpPr>
       <p:sp>
         <p:nvSpPr>
-          <p:cNvPr id="2" name="Content Placeholder 1">
-            <a:extLst>
-              <a:ext uri="{FF2B5EF4-FFF2-40B4-BE49-F238E27FC236}">
-                <a16:creationId xmlns:a16="http://schemas.microsoft.com/office/drawing/2014/main" id="{C181A3FC-2962-FED4-44B3-80F5C541F9C3}"/>
-              </a:ext>
-            </a:extLst>
-          </p:cNvPr>
-          <p:cNvSpPr>
-            <a:spLocks noGrp="1"/>
-          </p:cNvSpPr>
-          <p:nvPr>
-            <p:ph idx="1"/>
-          </p:nvPr>
-        </p:nvSpPr>
-        <p:spPr/>
-        <p:txBody>
-          <a:bodyPr/>
-          <a:lstStyle/>
-          <a:p>
-            <a:endParaRPr lang="en-AE" dirty="0"/>
-          </a:p>
-        </p:txBody>
-      </p:sp>
-      <p:sp>
-        <p:nvSpPr>
           <p:cNvPr id="3" name="Title 2">
             <a:extLst>
               <a:ext uri="{FF2B5EF4-FFF2-40B4-BE49-F238E27FC236}">
@@ -10928,6 +11337,68 @@
               <a:t>7</a:t>
             </a:fld>
             <a:endParaRPr lang="en-US"/>
+          </a:p>
+        </p:txBody>
+      </p:sp>
+      <p:sp>
+        <p:nvSpPr>
+          <p:cNvPr id="9" name="Content Placeholder 1">
+            <a:extLst>
+              <a:ext uri="{FF2B5EF4-FFF2-40B4-BE49-F238E27FC236}">
+                <a16:creationId xmlns:a16="http://schemas.microsoft.com/office/drawing/2014/main" id="{F2D13416-B035-9180-9A9C-8D9AC661055E}"/>
+              </a:ext>
+            </a:extLst>
+          </p:cNvPr>
+          <p:cNvSpPr>
+            <a:spLocks noGrp="1"/>
+          </p:cNvSpPr>
+          <p:nvPr>
+            <p:ph idx="1"/>
+          </p:nvPr>
+        </p:nvSpPr>
+        <p:spPr>
+          <a:xfrm>
+            <a:off x="571499" y="1137256"/>
+            <a:ext cx="11209376" cy="4908082"/>
+          </a:xfrm>
+        </p:spPr>
+        <p:txBody>
+          <a:bodyPr vert="horz" lIns="91440" tIns="45720" rIns="91440" bIns="45720" rtlCol="0" anchor="t">
+            <a:normAutofit/>
+          </a:bodyPr>
+          <a:lstStyle/>
+          <a:p>
+            <a:r>
+              <a:rPr lang="en-GB" dirty="0"/>
+              <a:t>Optimizing​‍​‌‍​‍‌ resource constraints such as memory, computation, and model complexity for health risk analysis.</a:t>
+            </a:r>
+          </a:p>
+          <a:p>
+            <a:pPr marL="0" indent="0">
+              <a:buNone/>
+            </a:pPr>
+            <a:endParaRPr lang="en-GB" dirty="0"/>
+          </a:p>
+          <a:p>
+            <a:r>
+              <a:rPr lang="en-GB" dirty="0"/>
+              <a:t>Serving assistive technologies to elderly people in their early detection of diseases.</a:t>
+            </a:r>
+          </a:p>
+          <a:p>
+            <a:pPr marL="0" indent="0">
+              <a:buNone/>
+            </a:pPr>
+            <a:endParaRPr lang="en-GB" dirty="0"/>
+          </a:p>
+          <a:p>
+            <a:r>
+              <a:rPr lang="en-GB" dirty="0"/>
+              <a:t>Existing systems exhibits potential bias due to underrepresented population cohorts in the training data, hence, a generalized model is needed to mitigate ​‍​‌‍​‍‌bias.</a:t>
+            </a:r>
+          </a:p>
+          <a:p>
+            <a:endParaRPr lang="en-GB" dirty="0"/>
           </a:p>
         </p:txBody>
       </p:sp>
@@ -11004,7 +11475,7 @@
           <a:p>
             <a:r>
               <a:rPr lang="en-GB" sz="2600" dirty="0"/>
-              <a:t>The current phase focuses on the Cleveland Family Study (CFS) dataset, using its PSG recordings and clinical labels to build cardiac, respiratory, and mental health risk cohorts.</a:t>
+              <a:t>The current phase focuses on the Cleveland Family Study (CFS) dataset, using its PSG recordings and clinical labels to build cardiac, respiratory, and mental health risk detection system.</a:t>
             </a:r>
             <a:endParaRPr lang="en-AE" sz="2600" dirty="0"/>
           </a:p>
@@ -11105,31 +11576,36 @@
           <a:chExt cx="0" cy="0"/>
         </a:xfrm>
       </p:grpSpPr>
-      <p:sp>
-        <p:nvSpPr>
-          <p:cNvPr id="2" name="Content Placeholder 1">
-            <a:extLst>
-              <a:ext uri="{FF2B5EF4-FFF2-40B4-BE49-F238E27FC236}">
-                <a16:creationId xmlns:a16="http://schemas.microsoft.com/office/drawing/2014/main" id="{6C77E79C-3E0C-CECE-ADBE-A830BC9770AB}"/>
-              </a:ext>
-            </a:extLst>
-          </p:cNvPr>
-          <p:cNvSpPr>
-            <a:spLocks noGrp="1"/>
-          </p:cNvSpPr>
-          <p:nvPr>
-            <p:ph idx="1"/>
-          </p:nvPr>
-        </p:nvSpPr>
-        <p:spPr/>
-        <p:txBody>
-          <a:bodyPr/>
-          <a:lstStyle/>
-          <a:p>
-            <a:endParaRPr lang="en-AE" dirty="0"/>
-          </a:p>
-        </p:txBody>
-      </p:sp>
+      <p:pic>
+        <p:nvPicPr>
+          <p:cNvPr id="6" name="Picture 5" descr="A diagram of a data processing process&#10;&#10;AI-generated content may be incorrect.">
+            <a:extLst>
+              <a:ext uri="{FF2B5EF4-FFF2-40B4-BE49-F238E27FC236}">
+                <a16:creationId xmlns:a16="http://schemas.microsoft.com/office/drawing/2014/main" id="{0BA2B6DA-0FEE-EC08-10ED-DC3B42827F1D}"/>
+              </a:ext>
+            </a:extLst>
+          </p:cNvPr>
+          <p:cNvPicPr>
+            <a:picLocks noChangeAspect="1"/>
+          </p:cNvPicPr>
+          <p:nvPr/>
+        </p:nvPicPr>
+        <p:blipFill>
+          <a:blip r:embed="rId2"/>
+          <a:stretch>
+            <a:fillRect/>
+          </a:stretch>
+        </p:blipFill>
+        <p:spPr>
+          <a:xfrm>
+            <a:off x="1219200" y="745615"/>
+            <a:ext cx="9906000" cy="5600964"/>
+          </a:xfrm>
+          <a:prstGeom prst="rect">
+            <a:avLst/>
+          </a:prstGeom>
+        </p:spPr>
+      </p:pic>
       <p:sp>
         <p:nvSpPr>
           <p:cNvPr id="3" name="Title 2">

</xml_diff>

<commit_message>
pushing necessary pngs and ppts
</commit_message>
<xml_diff>
--- a/reports/Phase 1/Phase1_47.pptx
+++ b/reports/Phase 1/Phase1_47.pptx
@@ -6,7 +6,7 @@
     <p:sldMasterId id="2147483660" r:id="rId2"/>
   </p:sldMasterIdLst>
   <p:notesMasterIdLst>
-    <p:notesMasterId r:id="rId20"/>
+    <p:notesMasterId r:id="rId24"/>
   </p:notesMasterIdLst>
   <p:sldIdLst>
     <p:sldId id="261" r:id="rId3"/>
@@ -19,13 +19,17 @@
     <p:sldId id="1103" r:id="rId10"/>
     <p:sldId id="1104" r:id="rId11"/>
     <p:sldId id="1107" r:id="rId12"/>
-    <p:sldId id="1106" r:id="rId13"/>
-    <p:sldId id="1105" r:id="rId14"/>
-    <p:sldId id="1108" r:id="rId15"/>
-    <p:sldId id="1109" r:id="rId16"/>
-    <p:sldId id="1110" r:id="rId17"/>
-    <p:sldId id="1111" r:id="rId18"/>
-    <p:sldId id="1112" r:id="rId19"/>
+    <p:sldId id="1105" r:id="rId13"/>
+    <p:sldId id="1108" r:id="rId14"/>
+    <p:sldId id="1109" r:id="rId15"/>
+    <p:sldId id="1113" r:id="rId16"/>
+    <p:sldId id="1114" r:id="rId17"/>
+    <p:sldId id="1110" r:id="rId18"/>
+    <p:sldId id="1111" r:id="rId19"/>
+    <p:sldId id="1112" r:id="rId20"/>
+    <p:sldId id="1115" r:id="rId21"/>
+    <p:sldId id="1116" r:id="rId22"/>
+    <p:sldId id="1117" r:id="rId23"/>
   </p:sldIdLst>
   <p:sldSz cx="12192000" cy="6858000"/>
   <p:notesSz cx="6858000" cy="9144000"/>
@@ -222,7 +226,7 @@
           <a:p>
             <a:fld id="{18684B3B-E091-4218-B734-7F09C964D9E9}" type="datetimeFigureOut">
               <a:rPr lang="en-IN" smtClean="0"/>
-              <a:t>20-12-2025</a:t>
+              <a:t>21-12-2025</a:t>
             </a:fld>
             <a:endParaRPr lang="en-IN"/>
           </a:p>
@@ -8834,7 +8838,27 @@
                 <a:latin typeface="Times New Roman" panose="02020603050405020304" pitchFamily="18" charset="0"/>
                 <a:cs typeface="Times New Roman" panose="02020603050405020304" pitchFamily="18" charset="0"/>
               </a:rPr>
-              <a:t>R S Harish Kumar (AM.EN.U4CSE22042)</a:t>
+              <a:t>R S Harish Kumar (AM.EN</a:t>
+            </a:r>
+            <a:r>
+              <a:rPr lang="en-US">
+                <a:solidFill>
+                  <a:schemeClr val="bg1"/>
+                </a:solidFill>
+                <a:latin typeface="Times New Roman" panose="02020603050405020304" pitchFamily="18" charset="0"/>
+                <a:cs typeface="Times New Roman" panose="02020603050405020304" pitchFamily="18" charset="0"/>
+              </a:rPr>
+              <a:t>.U4AIE22042</a:t>
+            </a:r>
+            <a:r>
+              <a:rPr lang="en-US" dirty="0">
+                <a:solidFill>
+                  <a:schemeClr val="bg1"/>
+                </a:solidFill>
+                <a:latin typeface="Times New Roman" panose="02020603050405020304" pitchFamily="18" charset="0"/>
+                <a:cs typeface="Times New Roman" panose="02020603050405020304" pitchFamily="18" charset="0"/>
+              </a:rPr>
+              <a:t>)</a:t>
             </a:r>
             <a:endParaRPr lang="en-IN" dirty="0">
               <a:solidFill>
@@ -9157,126 +9181,6 @@
         <p:cNvPr id="1" name="">
           <a:extLst>
             <a:ext uri="{FF2B5EF4-FFF2-40B4-BE49-F238E27FC236}">
-              <a16:creationId xmlns:a16="http://schemas.microsoft.com/office/drawing/2014/main" id="{564974DF-7BCD-9BC5-6CAE-844755B554F9}"/>
-            </a:ext>
-          </a:extLst>
-        </p:cNvPr>
-        <p:cNvGrpSpPr/>
-        <p:nvPr/>
-      </p:nvGrpSpPr>
-      <p:grpSpPr>
-        <a:xfrm>
-          <a:off x="0" y="0"/>
-          <a:ext cx="0" cy="0"/>
-          <a:chOff x="0" y="0"/>
-          <a:chExt cx="0" cy="0"/>
-        </a:xfrm>
-      </p:grpSpPr>
-      <p:sp>
-        <p:nvSpPr>
-          <p:cNvPr id="2" name="Content Placeholder 1">
-            <a:extLst>
-              <a:ext uri="{FF2B5EF4-FFF2-40B4-BE49-F238E27FC236}">
-                <a16:creationId xmlns:a16="http://schemas.microsoft.com/office/drawing/2014/main" id="{330F6A6A-FC25-DA67-CBFE-52B792CB862F}"/>
-              </a:ext>
-            </a:extLst>
-          </p:cNvPr>
-          <p:cNvSpPr>
-            <a:spLocks noGrp="1"/>
-          </p:cNvSpPr>
-          <p:nvPr>
-            <p:ph idx="1"/>
-          </p:nvPr>
-        </p:nvSpPr>
-        <p:spPr/>
-        <p:txBody>
-          <a:bodyPr/>
-          <a:lstStyle/>
-          <a:p>
-            <a:endParaRPr lang="en-AE" dirty="0"/>
-          </a:p>
-        </p:txBody>
-      </p:sp>
-      <p:sp>
-        <p:nvSpPr>
-          <p:cNvPr id="3" name="Title 2">
-            <a:extLst>
-              <a:ext uri="{FF2B5EF4-FFF2-40B4-BE49-F238E27FC236}">
-                <a16:creationId xmlns:a16="http://schemas.microsoft.com/office/drawing/2014/main" id="{5FF9F9E6-0189-533B-9B51-6506667C10C6}"/>
-              </a:ext>
-            </a:extLst>
-          </p:cNvPr>
-          <p:cNvSpPr>
-            <a:spLocks noGrp="1"/>
-          </p:cNvSpPr>
-          <p:nvPr>
-            <p:ph type="title"/>
-          </p:nvPr>
-        </p:nvSpPr>
-        <p:spPr/>
-        <p:txBody>
-          <a:bodyPr/>
-          <a:lstStyle/>
-          <a:p>
-            <a:r>
-              <a:rPr lang="en-GB" dirty="0"/>
-              <a:t>Algorithm</a:t>
-            </a:r>
-            <a:endParaRPr lang="en-AE" dirty="0"/>
-          </a:p>
-        </p:txBody>
-      </p:sp>
-      <p:sp>
-        <p:nvSpPr>
-          <p:cNvPr id="4" name="Slide Number Placeholder 3">
-            <a:extLst>
-              <a:ext uri="{FF2B5EF4-FFF2-40B4-BE49-F238E27FC236}">
-                <a16:creationId xmlns:a16="http://schemas.microsoft.com/office/drawing/2014/main" id="{67E3A670-71EE-9288-0667-E6C560E4B56B}"/>
-              </a:ext>
-            </a:extLst>
-          </p:cNvPr>
-          <p:cNvSpPr>
-            <a:spLocks noGrp="1"/>
-          </p:cNvSpPr>
-          <p:nvPr>
-            <p:ph type="sldNum" sz="quarter" idx="12"/>
-          </p:nvPr>
-        </p:nvSpPr>
-        <p:spPr/>
-        <p:txBody>
-          <a:bodyPr/>
-          <a:lstStyle/>
-          <a:p>
-            <a:fld id="{330EA680-D336-4FF7-8B7A-9848BB0A1C32}" type="slidenum">
-              <a:rPr lang="en-US" smtClean="0"/>
-              <a:pPr/>
-              <a:t>11</a:t>
-            </a:fld>
-            <a:endParaRPr lang="en-US"/>
-          </a:p>
-        </p:txBody>
-      </p:sp>
-    </p:spTree>
-    <p:extLst>
-      <p:ext uri="{BB962C8B-B14F-4D97-AF65-F5344CB8AC3E}">
-        <p14:creationId xmlns:p14="http://schemas.microsoft.com/office/powerpoint/2010/main" val="3160225500"/>
-      </p:ext>
-    </p:extLst>
-  </p:cSld>
-  <p:clrMapOvr>
-    <a:masterClrMapping/>
-  </p:clrMapOvr>
-</p:sld>
-</file>
-
-<file path=ppt/slides/slide12.xml><?xml version="1.0" encoding="utf-8"?>
-<p:sld xmlns:a="http://schemas.openxmlformats.org/drawingml/2006/main" xmlns:r="http://schemas.openxmlformats.org/officeDocument/2006/relationships" xmlns:p="http://schemas.openxmlformats.org/presentationml/2006/main">
-  <p:cSld>
-    <p:spTree>
-      <p:nvGrpSpPr>
-        <p:cNvPr id="1" name="">
-          <a:extLst>
-            <a:ext uri="{FF2B5EF4-FFF2-40B4-BE49-F238E27FC236}">
               <a16:creationId xmlns:a16="http://schemas.microsoft.com/office/drawing/2014/main" id="{160EEC62-C92A-A2AE-4C1C-12005BCCB189}"/>
             </a:ext>
           </a:extLst>
@@ -9370,7 +9274,7 @@
             <a:fld id="{330EA680-D336-4FF7-8B7A-9848BB0A1C32}" type="slidenum">
               <a:rPr lang="en-US" smtClean="0"/>
               <a:pPr/>
-              <a:t>12</a:t>
+              <a:t>11</a:t>
             </a:fld>
             <a:endParaRPr lang="en-US"/>
           </a:p>
@@ -9389,7 +9293,7 @@
 </p:sld>
 </file>
 
-<file path=ppt/slides/slide13.xml><?xml version="1.0" encoding="utf-8"?>
+<file path=ppt/slides/slide12.xml><?xml version="1.0" encoding="utf-8"?>
 <p:sld xmlns:a="http://schemas.openxmlformats.org/drawingml/2006/main" xmlns:r="http://schemas.openxmlformats.org/officeDocument/2006/relationships" xmlns:p="http://schemas.openxmlformats.org/presentationml/2006/main">
   <p:cSld>
     <p:spTree>
@@ -9564,7 +9468,7 @@
             <a:fld id="{330EA680-D336-4FF7-8B7A-9848BB0A1C32}" type="slidenum">
               <a:rPr lang="en-US" smtClean="0"/>
               <a:pPr/>
-              <a:t>13</a:t>
+              <a:t>12</a:t>
             </a:fld>
             <a:endParaRPr lang="en-US"/>
           </a:p>
@@ -9583,7 +9487,7 @@
 </p:sld>
 </file>
 
-<file path=ppt/slides/slide14.xml><?xml version="1.0" encoding="utf-8"?>
+<file path=ppt/slides/slide13.xml><?xml version="1.0" encoding="utf-8"?>
 <p:sld xmlns:a="http://schemas.openxmlformats.org/drawingml/2006/main" xmlns:r="http://schemas.openxmlformats.org/officeDocument/2006/relationships" xmlns:p="http://schemas.openxmlformats.org/presentationml/2006/main">
   <p:cSld>
     <p:spTree>
@@ -9624,8 +9528,133 @@
         </p:nvSpPr>
         <p:spPr/>
         <p:txBody>
-          <a:bodyPr/>
-          <a:lstStyle/>
+          <a:bodyPr>
+            <a:normAutofit fontScale="92500" lnSpcReduction="10000"/>
+          </a:bodyPr>
+          <a:lstStyle/>
+          <a:p>
+            <a:r>
+              <a:rPr lang="en-GB" b="1" dirty="0"/>
+              <a:t>Search Convergence &amp; Stability</a:t>
+            </a:r>
+            <a:endParaRPr lang="en-GB" dirty="0"/>
+          </a:p>
+          <a:p>
+            <a:pPr lvl="1"/>
+            <a:r>
+              <a:rPr lang="en-GB" dirty="0"/>
+              <a:t>Training loss decreased steadily (</a:t>
+            </a:r>
+            <a:r>
+              <a:rPr lang="en-GB" b="1" dirty="0"/>
+              <a:t>0.348 → 0.289</a:t>
+            </a:r>
+            <a:r>
+              <a:rPr lang="en-GB" dirty="0"/>
+              <a:t>), with stable validation loss (~</a:t>
+            </a:r>
+            <a:r>
+              <a:rPr lang="en-GB" b="1" dirty="0"/>
+              <a:t>0.312</a:t>
+            </a:r>
+            <a:r>
+              <a:rPr lang="en-GB" dirty="0"/>
+              <a:t>), indicating reliable convergence.</a:t>
+            </a:r>
+          </a:p>
+          <a:p>
+            <a:pPr lvl="1"/>
+            <a:r>
+              <a:rPr lang="en-GB" dirty="0"/>
+              <a:t>Best </a:t>
+            </a:r>
+            <a:r>
+              <a:rPr lang="en-GB" b="1" dirty="0"/>
+              <a:t>validation accuracy: 90.6%</a:t>
+            </a:r>
+            <a:r>
+              <a:rPr lang="en-GB" dirty="0"/>
+              <a:t>, with a small train–</a:t>
+            </a:r>
+            <a:r>
+              <a:rPr lang="en-GB" dirty="0" err="1"/>
+              <a:t>val</a:t>
+            </a:r>
+            <a:r>
+              <a:rPr lang="en-GB" dirty="0"/>
+              <a:t> gap, suggesting good generalization and no </a:t>
+            </a:r>
+            <a:r>
+              <a:rPr lang="en-GB" dirty="0" err="1"/>
+              <a:t>supernet</a:t>
+            </a:r>
+            <a:r>
+              <a:rPr lang="en-GB" dirty="0"/>
+              <a:t> overfitting.</a:t>
+            </a:r>
+          </a:p>
+          <a:p>
+            <a:r>
+              <a:rPr lang="en-GB" b="1" dirty="0"/>
+              <a:t>Efficiency–Performance Trade-off</a:t>
+            </a:r>
+            <a:endParaRPr lang="en-GB" dirty="0"/>
+          </a:p>
+          <a:p>
+            <a:pPr lvl="1"/>
+            <a:r>
+              <a:rPr lang="en-GB" dirty="0"/>
+              <a:t>FLOPs increased gradually (</a:t>
+            </a:r>
+            <a:r>
+              <a:rPr lang="en-GB" b="1" dirty="0"/>
+              <a:t>1.28×10⁸ → 1.67×10⁸</a:t>
+            </a:r>
+            <a:r>
+              <a:rPr lang="en-GB" dirty="0"/>
+              <a:t>), correlating with accuracy gains.</a:t>
+            </a:r>
+          </a:p>
+          <a:p>
+            <a:r>
+              <a:rPr lang="en-GB" b="1" dirty="0"/>
+              <a:t>Discovered Architecture Characteristics</a:t>
+            </a:r>
+            <a:endParaRPr lang="en-GB" dirty="0"/>
+          </a:p>
+          <a:p>
+            <a:pPr lvl="1"/>
+            <a:r>
+              <a:rPr lang="en-GB" b="1" dirty="0"/>
+              <a:t>Multi-scale parallel branches</a:t>
+            </a:r>
+            <a:r>
+              <a:rPr lang="en-GB" dirty="0"/>
+              <a:t> capture temporal features at different resolutions.</a:t>
+            </a:r>
+          </a:p>
+          <a:p>
+            <a:pPr lvl="1"/>
+            <a:r>
+              <a:rPr lang="en-GB" b="1" dirty="0"/>
+              <a:t>Dilated 5×1 convolutions</a:t>
+            </a:r>
+            <a:r>
+              <a:rPr lang="en-GB" dirty="0"/>
+              <a:t> dominate, expanding receptive field without parameter growth.</a:t>
+            </a:r>
+          </a:p>
+          <a:p>
+            <a:pPr lvl="1"/>
+            <a:r>
+              <a:rPr lang="en-GB" b="1" dirty="0"/>
+              <a:t>Stacked attention blocks</a:t>
+            </a:r>
+            <a:r>
+              <a:rPr lang="en-GB" dirty="0"/>
+              <a:t> integrate local temporal patterns with global context.</a:t>
+            </a:r>
+          </a:p>
           <a:p>
             <a:endParaRPr lang="en-AE" dirty="0"/>
           </a:p>
@@ -9684,7 +9713,7 @@
             <a:fld id="{330EA680-D336-4FF7-8B7A-9848BB0A1C32}" type="slidenum">
               <a:rPr lang="en-US" smtClean="0"/>
               <a:pPr/>
-              <a:t>14</a:t>
+              <a:t>13</a:t>
             </a:fld>
             <a:endParaRPr lang="en-US"/>
           </a:p>
@@ -9703,7 +9732,338 @@
 </p:sld>
 </file>
 
+<file path=ppt/slides/slide14.xml><?xml version="1.0" encoding="utf-8"?>
+<p:sld xmlns:a="http://schemas.openxmlformats.org/drawingml/2006/main" xmlns:r="http://schemas.openxmlformats.org/officeDocument/2006/relationships" xmlns:p="http://schemas.openxmlformats.org/presentationml/2006/main">
+  <p:cSld>
+    <p:spTree>
+      <p:nvGrpSpPr>
+        <p:cNvPr id="1" name="">
+          <a:extLst>
+            <a:ext uri="{FF2B5EF4-FFF2-40B4-BE49-F238E27FC236}">
+              <a16:creationId xmlns:a16="http://schemas.microsoft.com/office/drawing/2014/main" id="{66845D36-DA2C-7969-4164-92FF777A3AA7}"/>
+            </a:ext>
+          </a:extLst>
+        </p:cNvPr>
+        <p:cNvGrpSpPr/>
+        <p:nvPr/>
+      </p:nvGrpSpPr>
+      <p:grpSpPr>
+        <a:xfrm>
+          <a:off x="0" y="0"/>
+          <a:ext cx="0" cy="0"/>
+          <a:chOff x="0" y="0"/>
+          <a:chExt cx="0" cy="0"/>
+        </a:xfrm>
+      </p:grpSpPr>
+      <p:sp>
+        <p:nvSpPr>
+          <p:cNvPr id="2" name="Content Placeholder 1">
+            <a:extLst>
+              <a:ext uri="{FF2B5EF4-FFF2-40B4-BE49-F238E27FC236}">
+                <a16:creationId xmlns:a16="http://schemas.microsoft.com/office/drawing/2014/main" id="{7A241D30-5E14-1978-7456-717A2240C12C}"/>
+              </a:ext>
+            </a:extLst>
+          </p:cNvPr>
+          <p:cNvSpPr>
+            <a:spLocks noGrp="1"/>
+          </p:cNvSpPr>
+          <p:nvPr>
+            <p:ph idx="1"/>
+          </p:nvPr>
+        </p:nvSpPr>
+        <p:spPr/>
+        <p:txBody>
+          <a:bodyPr>
+            <a:normAutofit fontScale="92500" lnSpcReduction="10000"/>
+          </a:bodyPr>
+          <a:lstStyle/>
+          <a:p>
+            <a:r>
+              <a:rPr lang="de-DE" b="1" dirty="0"/>
+              <a:t>Cardiovascular:</a:t>
+            </a:r>
+            <a:endParaRPr lang="de-DE" dirty="0"/>
+          </a:p>
+          <a:p>
+            <a:pPr lvl="1"/>
+            <a:r>
+              <a:rPr lang="de-DE" i="1" dirty="0"/>
+              <a:t>Hypertension</a:t>
+            </a:r>
+            <a:r>
+              <a:rPr lang="de-DE" dirty="0"/>
+              <a:t>: High sensitivity (224 TP), </a:t>
+            </a:r>
+            <a:r>
+              <a:rPr lang="de-DE" b="1" dirty="0"/>
+              <a:t>AUC ≈ 0.90</a:t>
+            </a:r>
+            <a:r>
+              <a:rPr lang="de-DE" dirty="0"/>
+              <a:t>, strong ECG-based discrimination.</a:t>
+            </a:r>
+          </a:p>
+          <a:p>
+            <a:pPr lvl="1"/>
+            <a:r>
+              <a:rPr lang="de-DE" i="1" dirty="0"/>
+              <a:t>Irregular heartbeat</a:t>
+            </a:r>
+            <a:r>
+              <a:rPr lang="de-DE" dirty="0"/>
+              <a:t>: High specificity (TN &gt; 700), effective detection of clear arrhythmia cases.</a:t>
+            </a:r>
+          </a:p>
+          <a:p>
+            <a:r>
+              <a:rPr lang="de-DE" b="1" dirty="0"/>
+              <a:t>Respiratory:</a:t>
+            </a:r>
+            <a:endParaRPr lang="de-DE" dirty="0"/>
+          </a:p>
+          <a:p>
+            <a:pPr lvl="1"/>
+            <a:r>
+              <a:rPr lang="de-DE" dirty="0"/>
+              <a:t>Asthma &amp; bronchitis show </a:t>
+            </a:r>
+            <a:r>
+              <a:rPr lang="de-DE" b="1" dirty="0"/>
+              <a:t>very high specificity (TN &gt; 650)</a:t>
+            </a:r>
+            <a:r>
+              <a:rPr lang="de-DE" dirty="0"/>
+              <a:t>, driven by RIP signals.</a:t>
+            </a:r>
+          </a:p>
+          <a:p>
+            <a:r>
+              <a:rPr lang="de-DE" b="1" dirty="0"/>
+              <a:t>Mental Health:</a:t>
+            </a:r>
+            <a:endParaRPr lang="de-DE" dirty="0"/>
+          </a:p>
+          <a:p>
+            <a:pPr lvl="1"/>
+            <a:r>
+              <a:rPr lang="de-DE" dirty="0"/>
+              <a:t>ADHD detection is robust, with sustained precision in PR curves using EEG features.</a:t>
+            </a:r>
+          </a:p>
+          <a:p>
+            <a:r>
+              <a:rPr lang="de-DE" b="1" dirty="0"/>
+              <a:t>Class Imbalance Effects</a:t>
+            </a:r>
+            <a:endParaRPr lang="de-DE" dirty="0"/>
+          </a:p>
+          <a:p>
+            <a:pPr lvl="1"/>
+            <a:r>
+              <a:rPr lang="de-DE" dirty="0"/>
+              <a:t>Rare conditions (e.g., stroke, myocardial infarction) show step-like PR behavior due to limited positive samples in CFS.</a:t>
+            </a:r>
+          </a:p>
+        </p:txBody>
+      </p:sp>
+      <p:sp>
+        <p:nvSpPr>
+          <p:cNvPr id="3" name="Title 2">
+            <a:extLst>
+              <a:ext uri="{FF2B5EF4-FFF2-40B4-BE49-F238E27FC236}">
+                <a16:creationId xmlns:a16="http://schemas.microsoft.com/office/drawing/2014/main" id="{8D82EE6A-4CCA-9856-37CB-EBA9407D63DD}"/>
+              </a:ext>
+            </a:extLst>
+          </p:cNvPr>
+          <p:cNvSpPr>
+            <a:spLocks noGrp="1"/>
+          </p:cNvSpPr>
+          <p:nvPr>
+            <p:ph type="title"/>
+          </p:nvPr>
+        </p:nvSpPr>
+        <p:spPr/>
+        <p:txBody>
+          <a:bodyPr/>
+          <a:lstStyle/>
+          <a:p>
+            <a:r>
+              <a:rPr lang="en-GB" dirty="0"/>
+              <a:t>Result Analysis</a:t>
+            </a:r>
+            <a:endParaRPr lang="en-AE" dirty="0"/>
+          </a:p>
+        </p:txBody>
+      </p:sp>
+      <p:sp>
+        <p:nvSpPr>
+          <p:cNvPr id="4" name="Slide Number Placeholder 3">
+            <a:extLst>
+              <a:ext uri="{FF2B5EF4-FFF2-40B4-BE49-F238E27FC236}">
+                <a16:creationId xmlns:a16="http://schemas.microsoft.com/office/drawing/2014/main" id="{0F48263A-370B-E4F2-A3F5-CA62CAB9C82D}"/>
+              </a:ext>
+            </a:extLst>
+          </p:cNvPr>
+          <p:cNvSpPr>
+            <a:spLocks noGrp="1"/>
+          </p:cNvSpPr>
+          <p:nvPr>
+            <p:ph type="sldNum" sz="quarter" idx="12"/>
+          </p:nvPr>
+        </p:nvSpPr>
+        <p:spPr/>
+        <p:txBody>
+          <a:bodyPr/>
+          <a:lstStyle/>
+          <a:p>
+            <a:fld id="{330EA680-D336-4FF7-8B7A-9848BB0A1C32}" type="slidenum">
+              <a:rPr lang="en-US" smtClean="0"/>
+              <a:pPr/>
+              <a:t>14</a:t>
+            </a:fld>
+            <a:endParaRPr lang="en-US"/>
+          </a:p>
+        </p:txBody>
+      </p:sp>
+    </p:spTree>
+    <p:extLst>
+      <p:ext uri="{BB962C8B-B14F-4D97-AF65-F5344CB8AC3E}">
+        <p14:creationId xmlns:p14="http://schemas.microsoft.com/office/powerpoint/2010/main" val="4209832635"/>
+      </p:ext>
+    </p:extLst>
+  </p:cSld>
+  <p:clrMapOvr>
+    <a:masterClrMapping/>
+  </p:clrMapOvr>
+</p:sld>
+</file>
+
 <file path=ppt/slides/slide15.xml><?xml version="1.0" encoding="utf-8"?>
+<p:sld xmlns:a="http://schemas.openxmlformats.org/drawingml/2006/main" xmlns:r="http://schemas.openxmlformats.org/officeDocument/2006/relationships" xmlns:p="http://schemas.openxmlformats.org/presentationml/2006/main">
+  <p:cSld>
+    <p:spTree>
+      <p:nvGrpSpPr>
+        <p:cNvPr id="1" name="">
+          <a:extLst>
+            <a:ext uri="{FF2B5EF4-FFF2-40B4-BE49-F238E27FC236}">
+              <a16:creationId xmlns:a16="http://schemas.microsoft.com/office/drawing/2014/main" id="{88FAD85D-CDB0-4E03-EDBE-E9A08A591105}"/>
+            </a:ext>
+          </a:extLst>
+        </p:cNvPr>
+        <p:cNvGrpSpPr/>
+        <p:nvPr/>
+      </p:nvGrpSpPr>
+      <p:grpSpPr>
+        <a:xfrm>
+          <a:off x="0" y="0"/>
+          <a:ext cx="0" cy="0"/>
+          <a:chOff x="0" y="0"/>
+          <a:chExt cx="0" cy="0"/>
+        </a:xfrm>
+      </p:grpSpPr>
+      <p:sp>
+        <p:nvSpPr>
+          <p:cNvPr id="3" name="Title 2">
+            <a:extLst>
+              <a:ext uri="{FF2B5EF4-FFF2-40B4-BE49-F238E27FC236}">
+                <a16:creationId xmlns:a16="http://schemas.microsoft.com/office/drawing/2014/main" id="{9659CB10-3EA2-8EEC-5375-9684C10D9B9B}"/>
+              </a:ext>
+            </a:extLst>
+          </p:cNvPr>
+          <p:cNvSpPr>
+            <a:spLocks noGrp="1"/>
+          </p:cNvSpPr>
+          <p:nvPr>
+            <p:ph type="title"/>
+          </p:nvPr>
+        </p:nvSpPr>
+        <p:spPr/>
+        <p:txBody>
+          <a:bodyPr/>
+          <a:lstStyle/>
+          <a:p>
+            <a:r>
+              <a:rPr lang="en-GB" dirty="0"/>
+              <a:t>Result Analysis</a:t>
+            </a:r>
+            <a:endParaRPr lang="en-AE" dirty="0"/>
+          </a:p>
+        </p:txBody>
+      </p:sp>
+      <p:sp>
+        <p:nvSpPr>
+          <p:cNvPr id="4" name="Slide Number Placeholder 3">
+            <a:extLst>
+              <a:ext uri="{FF2B5EF4-FFF2-40B4-BE49-F238E27FC236}">
+                <a16:creationId xmlns:a16="http://schemas.microsoft.com/office/drawing/2014/main" id="{5D8FC089-ECFB-3FF2-1161-4399BA6783A5}"/>
+              </a:ext>
+            </a:extLst>
+          </p:cNvPr>
+          <p:cNvSpPr>
+            <a:spLocks noGrp="1"/>
+          </p:cNvSpPr>
+          <p:nvPr>
+            <p:ph type="sldNum" sz="quarter" idx="12"/>
+          </p:nvPr>
+        </p:nvSpPr>
+        <p:spPr/>
+        <p:txBody>
+          <a:bodyPr/>
+          <a:lstStyle/>
+          <a:p>
+            <a:fld id="{330EA680-D336-4FF7-8B7A-9848BB0A1C32}" type="slidenum">
+              <a:rPr lang="en-US" smtClean="0"/>
+              <a:pPr/>
+              <a:t>15</a:t>
+            </a:fld>
+            <a:endParaRPr lang="en-US"/>
+          </a:p>
+        </p:txBody>
+      </p:sp>
+      <p:pic>
+        <p:nvPicPr>
+          <p:cNvPr id="6" name="Picture 5" descr="A graph with lines and numbers&#10;&#10;AI-generated content may be incorrect.">
+            <a:extLst>
+              <a:ext uri="{FF2B5EF4-FFF2-40B4-BE49-F238E27FC236}">
+                <a16:creationId xmlns:a16="http://schemas.microsoft.com/office/drawing/2014/main" id="{5F57EE97-6696-C47B-0F8C-708DC7AFD988}"/>
+              </a:ext>
+            </a:extLst>
+          </p:cNvPr>
+          <p:cNvPicPr>
+            <a:picLocks noChangeAspect="1"/>
+          </p:cNvPicPr>
+          <p:nvPr/>
+        </p:nvPicPr>
+        <p:blipFill>
+          <a:blip r:embed="rId2"/>
+          <a:stretch>
+            <a:fillRect/>
+          </a:stretch>
+        </p:blipFill>
+        <p:spPr>
+          <a:xfrm>
+            <a:off x="401336" y="1270001"/>
+            <a:ext cx="11504180" cy="4361542"/>
+          </a:xfrm>
+          <a:prstGeom prst="rect">
+            <a:avLst/>
+          </a:prstGeom>
+        </p:spPr>
+      </p:pic>
+    </p:spTree>
+    <p:extLst>
+      <p:ext uri="{BB962C8B-B14F-4D97-AF65-F5344CB8AC3E}">
+        <p14:creationId xmlns:p14="http://schemas.microsoft.com/office/powerpoint/2010/main" val="234442159"/>
+      </p:ext>
+    </p:extLst>
+  </p:cSld>
+  <p:clrMapOvr>
+    <a:masterClrMapping/>
+  </p:clrMapOvr>
+</p:sld>
+</file>
+
+<file path=ppt/slides/slide16.xml><?xml version="1.0" encoding="utf-8"?>
 <p:sld xmlns:a="http://schemas.openxmlformats.org/drawingml/2006/main" xmlns:r="http://schemas.openxmlformats.org/officeDocument/2006/relationships" xmlns:p="http://schemas.openxmlformats.org/presentationml/2006/main">
   <p:cSld>
     <p:spTree>
@@ -9728,31 +10088,6 @@
       </p:grpSpPr>
       <p:sp>
         <p:nvSpPr>
-          <p:cNvPr id="2" name="Content Placeholder 1">
-            <a:extLst>
-              <a:ext uri="{FF2B5EF4-FFF2-40B4-BE49-F238E27FC236}">
-                <a16:creationId xmlns:a16="http://schemas.microsoft.com/office/drawing/2014/main" id="{018D451C-D6F7-7EB4-0776-839816468773}"/>
-              </a:ext>
-            </a:extLst>
-          </p:cNvPr>
-          <p:cNvSpPr>
-            <a:spLocks noGrp="1"/>
-          </p:cNvSpPr>
-          <p:nvPr>
-            <p:ph idx="1"/>
-          </p:nvPr>
-        </p:nvSpPr>
-        <p:spPr/>
-        <p:txBody>
-          <a:bodyPr/>
-          <a:lstStyle/>
-          <a:p>
-            <a:endParaRPr lang="en-AE" dirty="0"/>
-          </a:p>
-        </p:txBody>
-      </p:sp>
-      <p:sp>
-        <p:nvSpPr>
           <p:cNvPr id="3" name="Title 2">
             <a:extLst>
               <a:ext uri="{FF2B5EF4-FFF2-40B4-BE49-F238E27FC236}">
@@ -9804,9 +10139,147 @@
             <a:fld id="{330EA680-D336-4FF7-8B7A-9848BB0A1C32}" type="slidenum">
               <a:rPr lang="en-US" smtClean="0"/>
               <a:pPr/>
-              <a:t>15</a:t>
+              <a:t>16</a:t>
             </a:fld>
             <a:endParaRPr lang="en-US"/>
+          </a:p>
+        </p:txBody>
+      </p:sp>
+      <p:sp>
+        <p:nvSpPr>
+          <p:cNvPr id="5" name="Rectangle 1">
+            <a:extLst>
+              <a:ext uri="{FF2B5EF4-FFF2-40B4-BE49-F238E27FC236}">
+                <a16:creationId xmlns:a16="http://schemas.microsoft.com/office/drawing/2014/main" id="{003E610E-EEE6-9106-AF27-61376A7ED952}"/>
+              </a:ext>
+            </a:extLst>
+          </p:cNvPr>
+          <p:cNvSpPr>
+            <a:spLocks noGrp="1" noChangeArrowheads="1"/>
+          </p:cNvSpPr>
+          <p:nvPr>
+            <p:ph idx="1"/>
+          </p:nvPr>
+        </p:nvSpPr>
+        <p:spPr bwMode="auto">
+          <a:xfrm>
+            <a:off x="576808" y="1079024"/>
+            <a:ext cx="11038383" cy="4966488"/>
+          </a:xfrm>
+          <a:prstGeom prst="rect">
+            <a:avLst/>
+          </a:prstGeom>
+          <a:noFill/>
+          <a:ln>
+            <a:noFill/>
+          </a:ln>
+          <a:effectLst/>
+          <a:extLst>
+            <a:ext uri="{909E8E84-426E-40DD-AFC4-6F175D3DCCD1}">
+              <a14:hiddenFill xmlns:a14="http://schemas.microsoft.com/office/drawing/2010/main">
+                <a:solidFill>
+                  <a:schemeClr val="accent1"/>
+                </a:solidFill>
+              </a14:hiddenFill>
+            </a:ext>
+            <a:ext uri="{91240B29-F687-4F45-9708-019B960494DF}">
+              <a14:hiddenLine xmlns:a14="http://schemas.microsoft.com/office/drawing/2010/main" w="9525">
+                <a:solidFill>
+                  <a:schemeClr val="tx1"/>
+                </a:solidFill>
+                <a:miter lim="800000"/>
+                <a:headEnd/>
+                <a:tailEnd/>
+              </a14:hiddenLine>
+            </a:ext>
+            <a:ext uri="{AF507438-7753-43E0-B8FC-AC1667EBCBE1}">
+              <a14:hiddenEffects xmlns:a14="http://schemas.microsoft.com/office/drawing/2010/main">
+                <a:effectLst>
+                  <a:outerShdw dist="35921" dir="2700000" algn="ctr" rotWithShape="0">
+                    <a:schemeClr val="bg2"/>
+                  </a:outerShdw>
+                </a:effectLst>
+              </a14:hiddenEffects>
+            </a:ext>
+          </a:extLst>
+        </p:spPr>
+        <p:txBody>
+          <a:bodyPr vert="horz" wrap="square" lIns="91440" tIns="45720" rIns="91440" bIns="45720" numCol="1" anchor="ctr" anchorCtr="0" compatLnSpc="1">
+            <a:prstTxWarp prst="textNoShape">
+              <a:avLst/>
+            </a:prstTxWarp>
+            <a:spAutoFit/>
+          </a:bodyPr>
+          <a:lstStyle/>
+          <a:p>
+            <a:r>
+              <a:rPr lang="en-GB" sz="2600" b="1" dirty="0"/>
+              <a:t>Class​‍​‌‍​‍‌ Imbalance Sensitivity</a:t>
+            </a:r>
+            <a:r>
+              <a:rPr lang="en-GB" sz="2600" dirty="0"/>
+              <a:t>: The effectiveness of the system goes down for rare comorbidities (like myocardial infarction, stroke) as the number of positives is very low.</a:t>
+            </a:r>
+          </a:p>
+          <a:p>
+            <a:pPr marL="0" indent="0">
+              <a:buNone/>
+            </a:pPr>
+            <a:endParaRPr lang="en-GB" sz="2600" dirty="0"/>
+          </a:p>
+          <a:p>
+            <a:r>
+              <a:rPr lang="en-GB" sz="2600" b="1" dirty="0"/>
+              <a:t>Bias toward Majority Classes</a:t>
+            </a:r>
+            <a:r>
+              <a:rPr lang="en-GB" sz="2600" dirty="0"/>
+              <a:t>: The NAS search goal is to increase the overall accuracy, hence the result is that the model is mostly tuned on the majority of the frequent disease labels in the multi-label settings.</a:t>
+            </a:r>
+          </a:p>
+          <a:p>
+            <a:pPr marL="0" indent="0">
+              <a:buNone/>
+            </a:pPr>
+            <a:endParaRPr lang="en-GB" sz="2600" dirty="0"/>
+          </a:p>
+          <a:p>
+            <a:r>
+              <a:rPr lang="en-GB" sz="2600" b="1" dirty="0"/>
+              <a:t>Reduced Sensitivity for Rare Events</a:t>
+            </a:r>
+            <a:r>
+              <a:rPr lang="en-GB" sz="2600" dirty="0"/>
+              <a:t>: Overall, the framework is highly efficient and accurate, but it exhibits lower recall for rare acute ​‍​‌‍​‍‌conditions.</a:t>
+            </a:r>
+          </a:p>
+          <a:p>
+            <a:pPr marL="0" marR="0" lvl="0" indent="0" algn="l" defTabSz="914400" rtl="0" eaLnBrk="0" fontAlgn="base" latinLnBrk="0" hangingPunct="0">
+              <a:lnSpc>
+                <a:spcPct val="100000"/>
+              </a:lnSpc>
+              <a:spcBef>
+                <a:spcPct val="0"/>
+              </a:spcBef>
+              <a:spcAft>
+                <a:spcPct val="0"/>
+              </a:spcAft>
+              <a:buClrTx/>
+              <a:buSzTx/>
+              <a:buFontTx/>
+              <a:buChar char="•"/>
+              <a:tabLst/>
+            </a:pPr>
+            <a:endParaRPr kumimoji="0" lang="en-US" altLang="en-US" sz="2600" b="0" i="0" u="none" strike="noStrike" cap="none" normalizeH="0" baseline="0" dirty="0">
+              <a:ln>
+                <a:noFill/>
+              </a:ln>
+              <a:solidFill>
+                <a:schemeClr val="tx1"/>
+              </a:solidFill>
+              <a:effectLst/>
+              <a:latin typeface="Arial" panose="020B0604020202020204" pitchFamily="34" charset="0"/>
+            </a:endParaRPr>
           </a:p>
         </p:txBody>
       </p:sp>
@@ -9823,7 +10296,7 @@
 </p:sld>
 </file>
 
-<file path=ppt/slides/slide16.xml><?xml version="1.0" encoding="utf-8"?>
+<file path=ppt/slides/slide17.xml><?xml version="1.0" encoding="utf-8"?>
 <p:sld xmlns:a="http://schemas.openxmlformats.org/drawingml/2006/main" xmlns:r="http://schemas.openxmlformats.org/officeDocument/2006/relationships" xmlns:p="http://schemas.openxmlformats.org/presentationml/2006/main">
   <p:cSld>
     <p:spTree>
@@ -9848,31 +10321,6 @@
       </p:grpSpPr>
       <p:sp>
         <p:nvSpPr>
-          <p:cNvPr id="2" name="Content Placeholder 1">
-            <a:extLst>
-              <a:ext uri="{FF2B5EF4-FFF2-40B4-BE49-F238E27FC236}">
-                <a16:creationId xmlns:a16="http://schemas.microsoft.com/office/drawing/2014/main" id="{A4BC72E8-5E8E-BC3A-69F8-D7CEB45C5EB0}"/>
-              </a:ext>
-            </a:extLst>
-          </p:cNvPr>
-          <p:cNvSpPr>
-            <a:spLocks noGrp="1"/>
-          </p:cNvSpPr>
-          <p:nvPr>
-            <p:ph idx="1"/>
-          </p:nvPr>
-        </p:nvSpPr>
-        <p:spPr/>
-        <p:txBody>
-          <a:bodyPr/>
-          <a:lstStyle/>
-          <a:p>
-            <a:endParaRPr lang="en-AE" dirty="0"/>
-          </a:p>
-        </p:txBody>
-      </p:sp>
-      <p:sp>
-        <p:nvSpPr>
           <p:cNvPr id="3" name="Title 2">
             <a:extLst>
               <a:ext uri="{FF2B5EF4-FFF2-40B4-BE49-F238E27FC236}">
@@ -9924,9 +10372,190 @@
             <a:fld id="{330EA680-D336-4FF7-8B7A-9848BB0A1C32}" type="slidenum">
               <a:rPr lang="en-US" smtClean="0"/>
               <a:pPr/>
-              <a:t>16</a:t>
+              <a:t>17</a:t>
             </a:fld>
             <a:endParaRPr lang="en-US"/>
+          </a:p>
+        </p:txBody>
+      </p:sp>
+      <p:sp>
+        <p:nvSpPr>
+          <p:cNvPr id="5" name="Rectangle 1">
+            <a:extLst>
+              <a:ext uri="{FF2B5EF4-FFF2-40B4-BE49-F238E27FC236}">
+                <a16:creationId xmlns:a16="http://schemas.microsoft.com/office/drawing/2014/main" id="{C63D5C3C-F403-75C1-896B-62D57BD9DA97}"/>
+              </a:ext>
+            </a:extLst>
+          </p:cNvPr>
+          <p:cNvSpPr>
+            <a:spLocks noGrp="1" noChangeArrowheads="1"/>
+          </p:cNvSpPr>
+          <p:nvPr>
+            <p:ph idx="1"/>
+          </p:nvPr>
+        </p:nvSpPr>
+        <p:spPr bwMode="auto">
+          <a:xfrm>
+            <a:off x="571499" y="1220005"/>
+            <a:ext cx="10880987" cy="4555093"/>
+          </a:xfrm>
+          <a:prstGeom prst="rect">
+            <a:avLst/>
+          </a:prstGeom>
+          <a:noFill/>
+          <a:ln>
+            <a:noFill/>
+          </a:ln>
+          <a:effectLst/>
+          <a:extLst>
+            <a:ext uri="{909E8E84-426E-40DD-AFC4-6F175D3DCCD1}">
+              <a14:hiddenFill xmlns:a14="http://schemas.microsoft.com/office/drawing/2010/main">
+                <a:solidFill>
+                  <a:schemeClr val="accent1"/>
+                </a:solidFill>
+              </a14:hiddenFill>
+            </a:ext>
+            <a:ext uri="{91240B29-F687-4F45-9708-019B960494DF}">
+              <a14:hiddenLine xmlns:a14="http://schemas.microsoft.com/office/drawing/2010/main" w="9525">
+                <a:solidFill>
+                  <a:schemeClr val="tx1"/>
+                </a:solidFill>
+                <a:miter lim="800000"/>
+                <a:headEnd/>
+                <a:tailEnd/>
+              </a14:hiddenLine>
+            </a:ext>
+            <a:ext uri="{AF507438-7753-43E0-B8FC-AC1667EBCBE1}">
+              <a14:hiddenEffects xmlns:a14="http://schemas.microsoft.com/office/drawing/2010/main">
+                <a:effectLst>
+                  <a:outerShdw dist="35921" dir="2700000" algn="ctr" rotWithShape="0">
+                    <a:schemeClr val="bg2"/>
+                  </a:outerShdw>
+                </a:effectLst>
+              </a14:hiddenEffects>
+            </a:ext>
+          </a:extLst>
+        </p:spPr>
+        <p:txBody>
+          <a:bodyPr vert="horz" wrap="square" lIns="91440" tIns="45720" rIns="91440" bIns="45720" numCol="1" anchor="ctr" anchorCtr="0" compatLnSpc="1">
+            <a:prstTxWarp prst="textNoShape">
+              <a:avLst/>
+            </a:prstTxWarp>
+            <a:spAutoFit/>
+          </a:bodyPr>
+          <a:lstStyle/>
+          <a:p>
+            <a:pPr marL="0" lvl="0" indent="0" eaLnBrk="0" fontAlgn="base" hangingPunct="0">
+              <a:lnSpc>
+                <a:spcPct val="100000"/>
+              </a:lnSpc>
+              <a:spcBef>
+                <a:spcPct val="0"/>
+              </a:spcBef>
+              <a:spcAft>
+                <a:spcPct val="0"/>
+              </a:spcAft>
+              <a:buFontTx/>
+              <a:buChar char="•"/>
+            </a:pPr>
+            <a:r>
+              <a:rPr lang="en-US" altLang="en-US" sz="2400" b="1" dirty="0"/>
+              <a:t>Data Expansion &amp; Validation:</a:t>
+            </a:r>
+            <a:br>
+              <a:rPr lang="en-US" altLang="en-US" sz="2400" dirty="0"/>
+            </a:br>
+            <a:r>
+              <a:rPr lang="en-US" altLang="en-US" sz="2400" dirty="0"/>
+              <a:t>Integrate large multi-center cohorts (WSC, SHHS, MESA, APPLES, </a:t>
+            </a:r>
+            <a:r>
+              <a:rPr lang="en-US" altLang="en-US" sz="2400" dirty="0" err="1"/>
+              <a:t>MrOS</a:t>
+            </a:r>
+            <a:r>
+              <a:rPr lang="en-US" altLang="en-US" sz="2400" dirty="0"/>
+              <a:t>) to improve robustness, address class imbalance, and enhance cross-cohort generalization.</a:t>
+            </a:r>
+          </a:p>
+          <a:p>
+            <a:pPr marL="0" lvl="0" indent="0" eaLnBrk="0" fontAlgn="base" hangingPunct="0">
+              <a:lnSpc>
+                <a:spcPct val="100000"/>
+              </a:lnSpc>
+              <a:spcBef>
+                <a:spcPct val="0"/>
+              </a:spcBef>
+              <a:spcAft>
+                <a:spcPct val="0"/>
+              </a:spcAft>
+              <a:buFontTx/>
+              <a:buChar char="•"/>
+            </a:pPr>
+            <a:r>
+              <a:rPr lang="en-US" altLang="en-US" sz="2400" b="1" dirty="0"/>
+              <a:t>Clinical Desktop Application:</a:t>
+            </a:r>
+            <a:br>
+              <a:rPr lang="en-US" altLang="en-US" sz="2400" dirty="0"/>
+            </a:br>
+            <a:r>
+              <a:rPr lang="en-US" altLang="en-US" sz="2400" dirty="0"/>
+              <a:t>Develop a user-friendly desktop tool enabling clinicians to upload raw EDF files and receive automated risk assessments without requiring Python expertise.</a:t>
+            </a:r>
+          </a:p>
+          <a:p>
+            <a:pPr marL="0" lvl="0" indent="0" eaLnBrk="0" fontAlgn="base" hangingPunct="0">
+              <a:lnSpc>
+                <a:spcPct val="100000"/>
+              </a:lnSpc>
+              <a:spcBef>
+                <a:spcPct val="0"/>
+              </a:spcBef>
+              <a:spcAft>
+                <a:spcPct val="0"/>
+              </a:spcAft>
+              <a:buFontTx/>
+              <a:buChar char="•"/>
+            </a:pPr>
+            <a:r>
+              <a:rPr lang="en-US" altLang="en-US" sz="2400" b="1" dirty="0"/>
+              <a:t>Deployment &amp; Packaging:</a:t>
+            </a:r>
+            <a:br>
+              <a:rPr lang="en-US" altLang="en-US" sz="2400" dirty="0"/>
+            </a:br>
+            <a:r>
+              <a:rPr lang="en-US" altLang="en-US" sz="2400" dirty="0"/>
+              <a:t>Package the optimized model and application into a single executable for seamless installation on standard clinical workstations, including low-end systems.</a:t>
+            </a:r>
+          </a:p>
+          <a:p>
+            <a:pPr marL="0" marR="0" lvl="0" indent="0" algn="l" defTabSz="914400" rtl="0" eaLnBrk="0" fontAlgn="base" latinLnBrk="0" hangingPunct="0">
+              <a:lnSpc>
+                <a:spcPct val="100000"/>
+              </a:lnSpc>
+              <a:spcBef>
+                <a:spcPct val="0"/>
+              </a:spcBef>
+              <a:spcAft>
+                <a:spcPct val="0"/>
+              </a:spcAft>
+              <a:buClrTx/>
+              <a:buSzTx/>
+              <a:buFontTx/>
+              <a:buChar char="•"/>
+              <a:tabLst/>
+            </a:pPr>
+            <a:endParaRPr kumimoji="0" lang="en-US" altLang="en-US" sz="2600" b="0" i="0" u="none" strike="noStrike" cap="none" normalizeH="0" baseline="0" dirty="0">
+              <a:ln>
+                <a:noFill/>
+              </a:ln>
+              <a:solidFill>
+                <a:schemeClr val="tx1"/>
+              </a:solidFill>
+              <a:effectLst/>
+            </a:endParaRPr>
           </a:p>
         </p:txBody>
       </p:sp>
@@ -9943,7 +10572,7 @@
 </p:sld>
 </file>
 
-<file path=ppt/slides/slide17.xml><?xml version="1.0" encoding="utf-8"?>
+<file path=ppt/slides/slide18.xml><?xml version="1.0" encoding="utf-8"?>
 <p:sld xmlns:a="http://schemas.openxmlformats.org/drawingml/2006/main" xmlns:r="http://schemas.openxmlformats.org/officeDocument/2006/relationships" xmlns:p="http://schemas.openxmlformats.org/presentationml/2006/main">
   <p:cSld>
     <p:spTree>
@@ -9984,37 +10613,131 @@
         </p:nvSpPr>
         <p:spPr/>
         <p:txBody>
+          <a:bodyPr>
+            <a:normAutofit fontScale="85000" lnSpcReduction="20000"/>
+          </a:bodyPr>
+          <a:lstStyle/>
+          <a:p>
+            <a:r>
+              <a:rPr lang="de-DE" dirty="0"/>
+              <a:t>Kim, Y., Jang, T. G., Park, S. Y., Park, H. Y., Lee, J. A., Oyun-Erdene, T., ... &amp; Urtnasan, E. (2025). Multimodal AI-approach for the automatic screening of cardiovascular diseases based on nocturnal physiological signals. </a:t>
+            </a:r>
+            <a:r>
+              <a:rPr lang="de-DE" i="1" dirty="0"/>
+              <a:t>npj Cardiovascular Health</a:t>
+            </a:r>
+            <a:r>
+              <a:rPr lang="de-DE" dirty="0"/>
+              <a:t>, </a:t>
+            </a:r>
+            <a:r>
+              <a:rPr lang="de-DE" i="1" dirty="0"/>
+              <a:t>2</a:t>
+            </a:r>
+            <a:r>
+              <a:rPr lang="de-DE" dirty="0"/>
+              <a:t>(1), 15.</a:t>
+            </a:r>
+          </a:p>
+          <a:p>
+            <a:r>
+              <a:rPr lang="de-DE" dirty="0"/>
+              <a:t>Lee, H., Choi, Y. R., Lee, H. K., Jeong, J., Hong, J., Shin, H. W., &amp; Kim, H. S. (2025). Explainable vision transformer for automatic visual sleep staging on multimodal PSG signals. </a:t>
+            </a:r>
+            <a:r>
+              <a:rPr lang="de-DE" i="1" dirty="0"/>
+              <a:t>npj Digital Medicine</a:t>
+            </a:r>
+            <a:r>
+              <a:rPr lang="de-DE" dirty="0"/>
+              <a:t>, </a:t>
+            </a:r>
+            <a:r>
+              <a:rPr lang="de-DE" i="1" dirty="0"/>
+              <a:t>8</a:t>
+            </a:r>
+            <a:r>
+              <a:rPr lang="de-DE" dirty="0"/>
+              <a:t>(1), 55.</a:t>
+            </a:r>
+          </a:p>
+          <a:p>
+            <a:r>
+              <a:rPr lang="de-DE" dirty="0"/>
+              <a:t>Zhang, Z., Lin, B. S., Peng, C. W., &amp; Lin, B. S. (2024). Multi-modal sleep stage classification with two-stream encoder-decoder. </a:t>
+            </a:r>
+            <a:r>
+              <a:rPr lang="de-DE" i="1" dirty="0"/>
+              <a:t>IEEE Transactions on Neural Systems and Rehabilitation Engineering</a:t>
+            </a:r>
+            <a:r>
+              <a:rPr lang="de-DE" dirty="0"/>
+              <a:t>, </a:t>
+            </a:r>
+            <a:r>
+              <a:rPr lang="de-DE" i="1" dirty="0"/>
+              <a:t>32</a:t>
+            </a:r>
+            <a:r>
+              <a:rPr lang="de-DE" dirty="0"/>
+              <a:t>, 2096-2105.</a:t>
+            </a:r>
+          </a:p>
+          <a:p>
+            <a:r>
+              <a:rPr lang="de-DE" dirty="0"/>
+              <a:t>Liu, R., Li, J., Wen, Y., Huang, X., Sheng, B., Feng, D. D., &amp; Zhang, P. (2025). MHFNet: a multimodal hybrid-embedding fusion network for automatic sleep staging. </a:t>
+            </a:r>
+            <a:r>
+              <a:rPr lang="de-DE" i="1" dirty="0"/>
+              <a:t>IEEE Journal of Biomedical and Health Informatics</a:t>
+            </a:r>
+            <a:r>
+              <a:rPr lang="de-DE" dirty="0"/>
+              <a:t>.</a:t>
+            </a:r>
+          </a:p>
+          <a:p>
+            <a:r>
+              <a:rPr lang="de-DE" dirty="0"/>
+              <a:t>Jiang, X., Zhao, J., Du, B., &amp; Yuan, Z. (2021, July). Self-supervised contrastive learning for EEG-based sleep staging. In </a:t>
+            </a:r>
+            <a:r>
+              <a:rPr lang="de-DE" i="1" dirty="0"/>
+              <a:t>2021 International Joint Conference on Neural Networks (IJCNN)</a:t>
+            </a:r>
+            <a:r>
+              <a:rPr lang="de-DE" dirty="0"/>
+              <a:t> (pp. 1-8). IEEE.</a:t>
+            </a:r>
+            <a:endParaRPr lang="en-AE" dirty="0"/>
+          </a:p>
+        </p:txBody>
+      </p:sp>
+      <p:sp>
+        <p:nvSpPr>
+          <p:cNvPr id="3" name="Title 2">
+            <a:extLst>
+              <a:ext uri="{FF2B5EF4-FFF2-40B4-BE49-F238E27FC236}">
+                <a16:creationId xmlns:a16="http://schemas.microsoft.com/office/drawing/2014/main" id="{57EBB3AF-8C3E-EF4C-709E-98C4F2A4B774}"/>
+              </a:ext>
+            </a:extLst>
+          </p:cNvPr>
+          <p:cNvSpPr>
+            <a:spLocks noGrp="1"/>
+          </p:cNvSpPr>
+          <p:nvPr>
+            <p:ph type="title"/>
+          </p:nvPr>
+        </p:nvSpPr>
+        <p:spPr/>
+        <p:txBody>
           <a:bodyPr/>
           <a:lstStyle/>
           <a:p>
-            <a:endParaRPr lang="en-AE" dirty="0"/>
-          </a:p>
-        </p:txBody>
-      </p:sp>
-      <p:sp>
-        <p:nvSpPr>
-          <p:cNvPr id="3" name="Title 2">
-            <a:extLst>
-              <a:ext uri="{FF2B5EF4-FFF2-40B4-BE49-F238E27FC236}">
-                <a16:creationId xmlns:a16="http://schemas.microsoft.com/office/drawing/2014/main" id="{57EBB3AF-8C3E-EF4C-709E-98C4F2A4B774}"/>
-              </a:ext>
-            </a:extLst>
-          </p:cNvPr>
-          <p:cNvSpPr>
-            <a:spLocks noGrp="1"/>
-          </p:cNvSpPr>
-          <p:nvPr>
-            <p:ph type="title"/>
-          </p:nvPr>
-        </p:nvSpPr>
-        <p:spPr/>
-        <p:txBody>
-          <a:bodyPr/>
-          <a:lstStyle/>
-          <a:p>
             <a:r>
               <a:rPr lang="en-GB" dirty="0"/>
-              <a:t>References</a:t>
+              <a:t>References(APA Style)</a:t>
             </a:r>
             <a:endParaRPr lang="en-AE" dirty="0"/>
           </a:p>
@@ -10044,7 +10767,7 @@
             <a:fld id="{330EA680-D336-4FF7-8B7A-9848BB0A1C32}" type="slidenum">
               <a:rPr lang="en-US" smtClean="0"/>
               <a:pPr/>
-              <a:t>17</a:t>
+              <a:t>18</a:t>
             </a:fld>
             <a:endParaRPr lang="en-US"/>
           </a:p>
@@ -10054,6 +10777,212 @@
     <p:extLst>
       <p:ext uri="{BB962C8B-B14F-4D97-AF65-F5344CB8AC3E}">
         <p14:creationId xmlns:p14="http://schemas.microsoft.com/office/powerpoint/2010/main" val="1453087159"/>
+      </p:ext>
+    </p:extLst>
+  </p:cSld>
+  <p:clrMapOvr>
+    <a:masterClrMapping/>
+  </p:clrMapOvr>
+</p:sld>
+</file>
+
+<file path=ppt/slides/slide19.xml><?xml version="1.0" encoding="utf-8"?>
+<p:sld xmlns:a="http://schemas.openxmlformats.org/drawingml/2006/main" xmlns:r="http://schemas.openxmlformats.org/officeDocument/2006/relationships" xmlns:p="http://schemas.openxmlformats.org/presentationml/2006/main">
+  <p:cSld>
+    <p:spTree>
+      <p:nvGrpSpPr>
+        <p:cNvPr id="1" name="">
+          <a:extLst>
+            <a:ext uri="{FF2B5EF4-FFF2-40B4-BE49-F238E27FC236}">
+              <a16:creationId xmlns:a16="http://schemas.microsoft.com/office/drawing/2014/main" id="{821DF20A-1C2B-ABE4-74C1-A73754A2EF69}"/>
+            </a:ext>
+          </a:extLst>
+        </p:cNvPr>
+        <p:cNvGrpSpPr/>
+        <p:nvPr/>
+      </p:nvGrpSpPr>
+      <p:grpSpPr>
+        <a:xfrm>
+          <a:off x="0" y="0"/>
+          <a:ext cx="0" cy="0"/>
+          <a:chOff x="0" y="0"/>
+          <a:chExt cx="0" cy="0"/>
+        </a:xfrm>
+      </p:grpSpPr>
+      <p:sp>
+        <p:nvSpPr>
+          <p:cNvPr id="2" name="Content Placeholder 1">
+            <a:extLst>
+              <a:ext uri="{FF2B5EF4-FFF2-40B4-BE49-F238E27FC236}">
+                <a16:creationId xmlns:a16="http://schemas.microsoft.com/office/drawing/2014/main" id="{A12C049F-092D-4933-0295-01838C217BB8}"/>
+              </a:ext>
+            </a:extLst>
+          </p:cNvPr>
+          <p:cNvSpPr>
+            <a:spLocks noGrp="1"/>
+          </p:cNvSpPr>
+          <p:nvPr>
+            <p:ph idx="1"/>
+          </p:nvPr>
+        </p:nvSpPr>
+        <p:spPr/>
+        <p:txBody>
+          <a:bodyPr>
+            <a:normAutofit fontScale="85000" lnSpcReduction="20000"/>
+          </a:bodyPr>
+          <a:lstStyle/>
+          <a:p>
+            <a:r>
+              <a:rPr lang="de-DE" dirty="0"/>
+              <a:t>Weng, W., Gu, Y., Guo, S., Ma, Y., Yang, Z., Liu, Y., &amp; Chen, Y. (2025). Self-supervised learning for electroencephalogram: A systematic survey. </a:t>
+            </a:r>
+            <a:r>
+              <a:rPr lang="de-DE" i="1" dirty="0"/>
+              <a:t>ACM Computing Surveys</a:t>
+            </a:r>
+            <a:r>
+              <a:rPr lang="de-DE" dirty="0"/>
+              <a:t>, </a:t>
+            </a:r>
+            <a:r>
+              <a:rPr lang="de-DE" i="1" dirty="0"/>
+              <a:t>57</a:t>
+            </a:r>
+            <a:r>
+              <a:rPr lang="de-DE" dirty="0"/>
+              <a:t>(12), 1-38.</a:t>
+            </a:r>
+          </a:p>
+          <a:p>
+            <a:r>
+              <a:rPr lang="en-GB" dirty="0"/>
+              <a:t>LeCun, Y., Bengio, Y., &amp; Hinton, G. (2015). Deep learning. </a:t>
+            </a:r>
+            <a:r>
+              <a:rPr lang="en-GB" i="1" dirty="0"/>
+              <a:t>nature</a:t>
+            </a:r>
+            <a:r>
+              <a:rPr lang="en-GB" dirty="0"/>
+              <a:t>, </a:t>
+            </a:r>
+            <a:r>
+              <a:rPr lang="en-GB" i="1" dirty="0"/>
+              <a:t>521</a:t>
+            </a:r>
+            <a:r>
+              <a:rPr lang="en-GB" dirty="0"/>
+              <a:t>(7553), 436-444.</a:t>
+            </a:r>
+          </a:p>
+          <a:p>
+            <a:r>
+              <a:rPr lang="de-DE" dirty="0"/>
+              <a:t>Nie, G., Chen, X., Wang, Y., Chen, J., Shi, Y., Zhong, J., ... &amp; Leng, Y. (2025). A Zero-Burden Sleep Foundation Model Built on Cardiorespiratory Signals from 800,000+ Hours of Multi-Ethnic Sleep Recordings. </a:t>
+            </a:r>
+            <a:r>
+              <a:rPr lang="de-DE" i="1" dirty="0"/>
+              <a:t>medRxiv</a:t>
+            </a:r>
+            <a:r>
+              <a:rPr lang="de-DE" dirty="0"/>
+              <a:t>, 2025-09.</a:t>
+            </a:r>
+          </a:p>
+          <a:p>
+            <a:r>
+              <a:rPr lang="de-DE" dirty="0"/>
+              <a:t>Kjaer, M. R., Thapa, R., Ganjoo, G., Moore IV, H., Jennum, P. J., Westover, B. M., ... &amp; Brink-Kjaer, A. (2025). Stanford Sleep Bench: Evaluating Polysomnography Pre-training Methods for Sleep Foundation Models. </a:t>
+            </a:r>
+            <a:r>
+              <a:rPr lang="de-DE" i="1" dirty="0"/>
+              <a:t>arXiv preprint arXiv:2512.09591</a:t>
+            </a:r>
+            <a:r>
+              <a:rPr lang="de-DE" dirty="0"/>
+              <a:t>.</a:t>
+            </a:r>
+          </a:p>
+          <a:p>
+            <a:r>
+              <a:rPr lang="en-GB" dirty="0"/>
+              <a:t>Thapa, R., Kjær, M. R., He, B., Covert, I., Moore, H., Hanif, U., ... &amp; Zou, J. (2025). A multimodal sleep foundation model developed with 500k hours of sleep recordings for disease predictions. </a:t>
+            </a:r>
+            <a:r>
+              <a:rPr lang="en-GB" i="1" dirty="0" err="1"/>
+              <a:t>medRxiv</a:t>
+            </a:r>
+            <a:r>
+              <a:rPr lang="en-GB" dirty="0"/>
+              <a:t>.</a:t>
+            </a:r>
+            <a:endParaRPr lang="en-AE" dirty="0"/>
+          </a:p>
+        </p:txBody>
+      </p:sp>
+      <p:sp>
+        <p:nvSpPr>
+          <p:cNvPr id="3" name="Title 2">
+            <a:extLst>
+              <a:ext uri="{FF2B5EF4-FFF2-40B4-BE49-F238E27FC236}">
+                <a16:creationId xmlns:a16="http://schemas.microsoft.com/office/drawing/2014/main" id="{4FE1B9E3-1105-EA09-22CE-3F60EE90D1E0}"/>
+              </a:ext>
+            </a:extLst>
+          </p:cNvPr>
+          <p:cNvSpPr>
+            <a:spLocks noGrp="1"/>
+          </p:cNvSpPr>
+          <p:nvPr>
+            <p:ph type="title"/>
+          </p:nvPr>
+        </p:nvSpPr>
+        <p:spPr/>
+        <p:txBody>
+          <a:bodyPr/>
+          <a:lstStyle/>
+          <a:p>
+            <a:r>
+              <a:rPr lang="en-GB" dirty="0"/>
+              <a:t>References(APA Style)</a:t>
+            </a:r>
+            <a:endParaRPr lang="en-AE" dirty="0"/>
+          </a:p>
+        </p:txBody>
+      </p:sp>
+      <p:sp>
+        <p:nvSpPr>
+          <p:cNvPr id="4" name="Slide Number Placeholder 3">
+            <a:extLst>
+              <a:ext uri="{FF2B5EF4-FFF2-40B4-BE49-F238E27FC236}">
+                <a16:creationId xmlns:a16="http://schemas.microsoft.com/office/drawing/2014/main" id="{3F768528-EA78-8399-D32C-2120F83B07D2}"/>
+              </a:ext>
+            </a:extLst>
+          </p:cNvPr>
+          <p:cNvSpPr>
+            <a:spLocks noGrp="1"/>
+          </p:cNvSpPr>
+          <p:nvPr>
+            <p:ph type="sldNum" sz="quarter" idx="12"/>
+          </p:nvPr>
+        </p:nvSpPr>
+        <p:spPr/>
+        <p:txBody>
+          <a:bodyPr/>
+          <a:lstStyle/>
+          <a:p>
+            <a:fld id="{330EA680-D336-4FF7-8B7A-9848BB0A1C32}" type="slidenum">
+              <a:rPr lang="en-US" smtClean="0"/>
+              <a:pPr/>
+              <a:t>19</a:t>
+            </a:fld>
+            <a:endParaRPr lang="en-US"/>
+          </a:p>
+        </p:txBody>
+      </p:sp>
+    </p:spTree>
+    <p:extLst>
+      <p:ext uri="{BB962C8B-B14F-4D97-AF65-F5344CB8AC3E}">
+        <p14:creationId xmlns:p14="http://schemas.microsoft.com/office/powerpoint/2010/main" val="708406535"/>
       </p:ext>
     </p:extLst>
   </p:cSld>
@@ -10294,6 +11223,426 @@
     <p:extLst>
       <p:ext uri="{BB962C8B-B14F-4D97-AF65-F5344CB8AC3E}">
         <p14:creationId xmlns:p14="http://schemas.microsoft.com/office/powerpoint/2010/main" val="2683305199"/>
+      </p:ext>
+    </p:extLst>
+  </p:cSld>
+  <p:clrMapOvr>
+    <a:masterClrMapping/>
+  </p:clrMapOvr>
+</p:sld>
+</file>
+
+<file path=ppt/slides/slide20.xml><?xml version="1.0" encoding="utf-8"?>
+<p:sld xmlns:a="http://schemas.openxmlformats.org/drawingml/2006/main" xmlns:r="http://schemas.openxmlformats.org/officeDocument/2006/relationships" xmlns:p="http://schemas.openxmlformats.org/presentationml/2006/main">
+  <p:cSld>
+    <p:spTree>
+      <p:nvGrpSpPr>
+        <p:cNvPr id="1" name="">
+          <a:extLst>
+            <a:ext uri="{FF2B5EF4-FFF2-40B4-BE49-F238E27FC236}">
+              <a16:creationId xmlns:a16="http://schemas.microsoft.com/office/drawing/2014/main" id="{A301D14A-90D7-C202-6737-A03239C5E0F5}"/>
+            </a:ext>
+          </a:extLst>
+        </p:cNvPr>
+        <p:cNvGrpSpPr/>
+        <p:nvPr/>
+      </p:nvGrpSpPr>
+      <p:grpSpPr>
+        <a:xfrm>
+          <a:off x="0" y="0"/>
+          <a:ext cx="0" cy="0"/>
+          <a:chOff x="0" y="0"/>
+          <a:chExt cx="0" cy="0"/>
+        </a:xfrm>
+      </p:grpSpPr>
+      <p:sp>
+        <p:nvSpPr>
+          <p:cNvPr id="2" name="Content Placeholder 1">
+            <a:extLst>
+              <a:ext uri="{FF2B5EF4-FFF2-40B4-BE49-F238E27FC236}">
+                <a16:creationId xmlns:a16="http://schemas.microsoft.com/office/drawing/2014/main" id="{22FEC6AD-66CC-3A21-F7D4-7F35F751028F}"/>
+              </a:ext>
+            </a:extLst>
+          </p:cNvPr>
+          <p:cNvSpPr>
+            <a:spLocks noGrp="1"/>
+          </p:cNvSpPr>
+          <p:nvPr>
+            <p:ph idx="1"/>
+          </p:nvPr>
+        </p:nvSpPr>
+        <p:spPr/>
+        <p:txBody>
+          <a:bodyPr>
+            <a:normAutofit fontScale="85000" lnSpcReduction="20000"/>
+          </a:bodyPr>
+          <a:lstStyle/>
+          <a:p>
+            <a:r>
+              <a:rPr lang="de-DE" dirty="0"/>
+              <a:t>Weng, W., Gu, Y., Guo, S., Ma, Y., Yang, Z., Liu, Y., &amp; Chen, Y. (2025). Self-supervised learning for electroencephalogram: A systematic survey. </a:t>
+            </a:r>
+            <a:r>
+              <a:rPr lang="de-DE" i="1" dirty="0"/>
+              <a:t>ACM Computing Surveys</a:t>
+            </a:r>
+            <a:r>
+              <a:rPr lang="de-DE" dirty="0"/>
+              <a:t>, </a:t>
+            </a:r>
+            <a:r>
+              <a:rPr lang="de-DE" i="1" dirty="0"/>
+              <a:t>57</a:t>
+            </a:r>
+            <a:r>
+              <a:rPr lang="de-DE" dirty="0"/>
+              <a:t>(12), 1-38.</a:t>
+            </a:r>
+          </a:p>
+          <a:p>
+            <a:r>
+              <a:rPr lang="en-GB" dirty="0"/>
+              <a:t>LeCun, Y., Bengio, Y., &amp; Hinton, G. (2015). Deep learning. </a:t>
+            </a:r>
+            <a:r>
+              <a:rPr lang="en-GB" i="1" dirty="0"/>
+              <a:t>nature</a:t>
+            </a:r>
+            <a:r>
+              <a:rPr lang="en-GB" dirty="0"/>
+              <a:t>, </a:t>
+            </a:r>
+            <a:r>
+              <a:rPr lang="en-GB" i="1" dirty="0"/>
+              <a:t>521</a:t>
+            </a:r>
+            <a:r>
+              <a:rPr lang="en-GB" dirty="0"/>
+              <a:t>(7553), 436-444.</a:t>
+            </a:r>
+          </a:p>
+          <a:p>
+            <a:r>
+              <a:rPr lang="de-DE" dirty="0"/>
+              <a:t>Nie, G., Chen, X., Wang, Y., Chen, J., Shi, Y., Zhong, J., ... &amp; Leng, Y. (2025). A Zero-Burden Sleep Foundation Model Built on Cardiorespiratory Signals from 800,000+ Hours of Multi-Ethnic Sleep Recordings. </a:t>
+            </a:r>
+            <a:r>
+              <a:rPr lang="de-DE" i="1" dirty="0"/>
+              <a:t>medRxiv</a:t>
+            </a:r>
+            <a:r>
+              <a:rPr lang="de-DE" dirty="0"/>
+              <a:t>, 2025-09.</a:t>
+            </a:r>
+          </a:p>
+          <a:p>
+            <a:r>
+              <a:rPr lang="de-DE" dirty="0"/>
+              <a:t>Kjaer, M. R., Thapa, R., Ganjoo, G., Moore IV, H., Jennum, P. J., Westover, B. M., ... &amp; Brink-Kjaer, A. (2025). Stanford Sleep Bench: Evaluating Polysomnography Pre-training Methods for Sleep Foundation Models. </a:t>
+            </a:r>
+            <a:r>
+              <a:rPr lang="de-DE" i="1" dirty="0"/>
+              <a:t>arXiv preprint arXiv:2512.09591</a:t>
+            </a:r>
+            <a:r>
+              <a:rPr lang="de-DE" dirty="0"/>
+              <a:t>.</a:t>
+            </a:r>
+          </a:p>
+          <a:p>
+            <a:r>
+              <a:rPr lang="en-GB" dirty="0"/>
+              <a:t>Thapa, R., Kjær, M. R., He, B., Covert, I., Moore, H., Hanif, U., ... &amp; Zou, J. (2025). A multimodal sleep foundation model developed with 500k hours of sleep recordings for disease predictions. </a:t>
+            </a:r>
+            <a:r>
+              <a:rPr lang="en-GB" i="1" dirty="0" err="1"/>
+              <a:t>medRxiv</a:t>
+            </a:r>
+            <a:r>
+              <a:rPr lang="en-GB" dirty="0"/>
+              <a:t>.</a:t>
+            </a:r>
+            <a:endParaRPr lang="en-AE" dirty="0"/>
+          </a:p>
+        </p:txBody>
+      </p:sp>
+      <p:sp>
+        <p:nvSpPr>
+          <p:cNvPr id="3" name="Title 2">
+            <a:extLst>
+              <a:ext uri="{FF2B5EF4-FFF2-40B4-BE49-F238E27FC236}">
+                <a16:creationId xmlns:a16="http://schemas.microsoft.com/office/drawing/2014/main" id="{CF1B05D2-D85F-8548-076D-3BE4F11042D4}"/>
+              </a:ext>
+            </a:extLst>
+          </p:cNvPr>
+          <p:cNvSpPr>
+            <a:spLocks noGrp="1"/>
+          </p:cNvSpPr>
+          <p:nvPr>
+            <p:ph type="title"/>
+          </p:nvPr>
+        </p:nvSpPr>
+        <p:spPr/>
+        <p:txBody>
+          <a:bodyPr/>
+          <a:lstStyle/>
+          <a:p>
+            <a:r>
+              <a:rPr lang="en-GB" dirty="0"/>
+              <a:t>References(APA Style)</a:t>
+            </a:r>
+            <a:endParaRPr lang="en-AE" dirty="0"/>
+          </a:p>
+        </p:txBody>
+      </p:sp>
+      <p:sp>
+        <p:nvSpPr>
+          <p:cNvPr id="4" name="Slide Number Placeholder 3">
+            <a:extLst>
+              <a:ext uri="{FF2B5EF4-FFF2-40B4-BE49-F238E27FC236}">
+                <a16:creationId xmlns:a16="http://schemas.microsoft.com/office/drawing/2014/main" id="{33E4B7C6-A0C9-52BC-3294-AC07C3B50349}"/>
+              </a:ext>
+            </a:extLst>
+          </p:cNvPr>
+          <p:cNvSpPr>
+            <a:spLocks noGrp="1"/>
+          </p:cNvSpPr>
+          <p:nvPr>
+            <p:ph type="sldNum" sz="quarter" idx="12"/>
+          </p:nvPr>
+        </p:nvSpPr>
+        <p:spPr/>
+        <p:txBody>
+          <a:bodyPr/>
+          <a:lstStyle/>
+          <a:p>
+            <a:fld id="{330EA680-D336-4FF7-8B7A-9848BB0A1C32}" type="slidenum">
+              <a:rPr lang="en-US" smtClean="0"/>
+              <a:pPr/>
+              <a:t>20</a:t>
+            </a:fld>
+            <a:endParaRPr lang="en-US"/>
+          </a:p>
+        </p:txBody>
+      </p:sp>
+    </p:spTree>
+    <p:extLst>
+      <p:ext uri="{BB962C8B-B14F-4D97-AF65-F5344CB8AC3E}">
+        <p14:creationId xmlns:p14="http://schemas.microsoft.com/office/powerpoint/2010/main" val="2299864101"/>
+      </p:ext>
+    </p:extLst>
+  </p:cSld>
+  <p:clrMapOvr>
+    <a:masterClrMapping/>
+  </p:clrMapOvr>
+</p:sld>
+</file>
+
+<file path=ppt/slides/slide21.xml><?xml version="1.0" encoding="utf-8"?>
+<p:sld xmlns:a="http://schemas.openxmlformats.org/drawingml/2006/main" xmlns:r="http://schemas.openxmlformats.org/officeDocument/2006/relationships" xmlns:p="http://schemas.openxmlformats.org/presentationml/2006/main">
+  <p:cSld>
+    <p:spTree>
+      <p:nvGrpSpPr>
+        <p:cNvPr id="1" name="">
+          <a:extLst>
+            <a:ext uri="{FF2B5EF4-FFF2-40B4-BE49-F238E27FC236}">
+              <a16:creationId xmlns:a16="http://schemas.microsoft.com/office/drawing/2014/main" id="{5613019A-C5E6-CDD6-87A0-8A1ABA46EA2B}"/>
+            </a:ext>
+          </a:extLst>
+        </p:cNvPr>
+        <p:cNvGrpSpPr/>
+        <p:nvPr/>
+      </p:nvGrpSpPr>
+      <p:grpSpPr>
+        <a:xfrm>
+          <a:off x="0" y="0"/>
+          <a:ext cx="0" cy="0"/>
+          <a:chOff x="0" y="0"/>
+          <a:chExt cx="0" cy="0"/>
+        </a:xfrm>
+      </p:grpSpPr>
+      <p:sp>
+        <p:nvSpPr>
+          <p:cNvPr id="2" name="Content Placeholder 1">
+            <a:extLst>
+              <a:ext uri="{FF2B5EF4-FFF2-40B4-BE49-F238E27FC236}">
+                <a16:creationId xmlns:a16="http://schemas.microsoft.com/office/drawing/2014/main" id="{015C7515-6AA8-C4E0-298C-2CBF430337C2}"/>
+              </a:ext>
+            </a:extLst>
+          </p:cNvPr>
+          <p:cNvSpPr>
+            <a:spLocks noGrp="1"/>
+          </p:cNvSpPr>
+          <p:nvPr>
+            <p:ph idx="1"/>
+          </p:nvPr>
+        </p:nvSpPr>
+        <p:spPr/>
+        <p:txBody>
+          <a:bodyPr>
+            <a:normAutofit fontScale="85000" lnSpcReduction="20000"/>
+          </a:bodyPr>
+          <a:lstStyle/>
+          <a:p>
+            <a:r>
+              <a:rPr lang="de-DE" dirty="0"/>
+              <a:t>Bilal, E., Araujo, M. L. D., Beck, K. L., Heinzinger, C. M., Ghosn, S., Saab, C. Y., ... &amp; Mehra, R. (2025). A Foundation Model for Sleep-Based Risk Stratification and Clinical Outcomes. </a:t>
+            </a:r>
+            <a:r>
+              <a:rPr lang="de-DE" i="1" dirty="0"/>
+              <a:t>Research Square</a:t>
+            </a:r>
+            <a:r>
+              <a:rPr lang="de-DE" dirty="0"/>
+              <a:t>, rs-3.</a:t>
+            </a:r>
+          </a:p>
+          <a:p>
+            <a:r>
+              <a:rPr lang="de-DE" dirty="0"/>
+              <a:t>He, Z., Li, H., Yuan, G., Killgore, W. D., Quan, S. F., Chen, C. X., &amp; Li, A. (2025). Multimodal Cardiovascular Risk Profiling Using Self-Supervised Learning of Polysomnography. </a:t>
+            </a:r>
+            <a:r>
+              <a:rPr lang="de-DE" i="1" dirty="0"/>
+              <a:t>SLEEPJ</a:t>
+            </a:r>
+            <a:r>
+              <a:rPr lang="de-DE" dirty="0"/>
+              <a:t>, zsaf371.</a:t>
+            </a:r>
+          </a:p>
+          <a:p>
+            <a:r>
+              <a:rPr lang="de-DE" dirty="0"/>
+              <a:t>Manimaran, G., Puthusserypady, S., Dominguez, H., &amp; Bardram, J. E. (2025). Cardiovascular Risk Assessment via Sleep Patterns and ECG-Based Biological Age Estimation. </a:t>
+            </a:r>
+            <a:r>
+              <a:rPr lang="de-DE" i="1" dirty="0"/>
+              <a:t>Journal of Clinical Medicine</a:t>
+            </a:r>
+            <a:r>
+              <a:rPr lang="de-DE" dirty="0"/>
+              <a:t>, </a:t>
+            </a:r>
+            <a:r>
+              <a:rPr lang="de-DE" i="1" dirty="0"/>
+              <a:t>14</a:t>
+            </a:r>
+            <a:r>
+              <a:rPr lang="de-DE" dirty="0"/>
+              <a:t>(10), 3339.</a:t>
+            </a:r>
+          </a:p>
+          <a:p>
+            <a:r>
+              <a:rPr lang="de-DE" dirty="0"/>
+              <a:t>Blanchard, M., Feuilloy, M., Gervès-Pinquié, C., Trzepizur, W., Meslier, N., Goupil, F., ... &amp; ERMES study group. (2021). Cardiovascular risk and mortality prediction in patients suspected of sleep apnea: a model based on an artificial intelligence system. </a:t>
+            </a:r>
+            <a:r>
+              <a:rPr lang="de-DE" i="1" dirty="0"/>
+              <a:t>Physiological Measurement</a:t>
+            </a:r>
+            <a:r>
+              <a:rPr lang="de-DE" dirty="0"/>
+              <a:t>, </a:t>
+            </a:r>
+            <a:r>
+              <a:rPr lang="de-DE" i="1" dirty="0"/>
+              <a:t>42</a:t>
+            </a:r>
+            <a:r>
+              <a:rPr lang="de-DE" dirty="0"/>
+              <a:t>(10), 105010.</a:t>
+            </a:r>
+          </a:p>
+          <a:p>
+            <a:r>
+              <a:rPr lang="en-GB" dirty="0" err="1"/>
+              <a:t>Fallmann</a:t>
+            </a:r>
+            <a:r>
+              <a:rPr lang="en-GB" dirty="0"/>
+              <a:t>, S., &amp; Chen, L. (2018, November). Detecting chronic diseases from sleep-wake behaviour and clinical features. In </a:t>
+            </a:r>
+            <a:r>
+              <a:rPr lang="en-GB" i="1" dirty="0"/>
+              <a:t>2018 5th international conference on systems and informatics (ICSAI)</a:t>
+            </a:r>
+            <a:r>
+              <a:rPr lang="en-GB" dirty="0"/>
+              <a:t> (pp. 1076-1084). </a:t>
+            </a:r>
+            <a:r>
+              <a:rPr lang="en-GB"/>
+              <a:t>IEEE.</a:t>
+            </a:r>
+            <a:endParaRPr lang="en-AE" dirty="0"/>
+          </a:p>
+        </p:txBody>
+      </p:sp>
+      <p:sp>
+        <p:nvSpPr>
+          <p:cNvPr id="3" name="Title 2">
+            <a:extLst>
+              <a:ext uri="{FF2B5EF4-FFF2-40B4-BE49-F238E27FC236}">
+                <a16:creationId xmlns:a16="http://schemas.microsoft.com/office/drawing/2014/main" id="{798E7123-4F73-9F97-F1A6-FBF53B9E1886}"/>
+              </a:ext>
+            </a:extLst>
+          </p:cNvPr>
+          <p:cNvSpPr>
+            <a:spLocks noGrp="1"/>
+          </p:cNvSpPr>
+          <p:nvPr>
+            <p:ph type="title"/>
+          </p:nvPr>
+        </p:nvSpPr>
+        <p:spPr/>
+        <p:txBody>
+          <a:bodyPr/>
+          <a:lstStyle/>
+          <a:p>
+            <a:r>
+              <a:rPr lang="en-GB" dirty="0"/>
+              <a:t>References(APA Style)</a:t>
+            </a:r>
+            <a:endParaRPr lang="en-AE" dirty="0"/>
+          </a:p>
+        </p:txBody>
+      </p:sp>
+      <p:sp>
+        <p:nvSpPr>
+          <p:cNvPr id="4" name="Slide Number Placeholder 3">
+            <a:extLst>
+              <a:ext uri="{FF2B5EF4-FFF2-40B4-BE49-F238E27FC236}">
+                <a16:creationId xmlns:a16="http://schemas.microsoft.com/office/drawing/2014/main" id="{1303A19A-8539-3FE4-8BF1-50F07A6B1083}"/>
+              </a:ext>
+            </a:extLst>
+          </p:cNvPr>
+          <p:cNvSpPr>
+            <a:spLocks noGrp="1"/>
+          </p:cNvSpPr>
+          <p:nvPr>
+            <p:ph type="sldNum" sz="quarter" idx="12"/>
+          </p:nvPr>
+        </p:nvSpPr>
+        <p:spPr/>
+        <p:txBody>
+          <a:bodyPr/>
+          <a:lstStyle/>
+          <a:p>
+            <a:fld id="{330EA680-D336-4FF7-8B7A-9848BB0A1C32}" type="slidenum">
+              <a:rPr lang="en-US" smtClean="0"/>
+              <a:pPr/>
+              <a:t>21</a:t>
+            </a:fld>
+            <a:endParaRPr lang="en-US"/>
+          </a:p>
+        </p:txBody>
+      </p:sp>
+    </p:spTree>
+    <p:extLst>
+      <p:ext uri="{BB962C8B-B14F-4D97-AF65-F5344CB8AC3E}">
+        <p14:creationId xmlns:p14="http://schemas.microsoft.com/office/powerpoint/2010/main" val="3674325920"/>
       </p:ext>
     </p:extLst>
   </p:cSld>
@@ -10808,35 +12157,26 @@
         <p:spPr/>
         <p:txBody>
           <a:bodyPr vert="horz" lIns="91440" tIns="45720" rIns="91440" bIns="45720" rtlCol="0" anchor="t">
-            <a:normAutofit fontScale="92500" lnSpcReduction="20000"/>
+            <a:normAutofit/>
           </a:bodyPr>
           <a:lstStyle/>
           <a:p>
             <a:r>
               <a:rPr lang="en-GB" dirty="0"/>
-              <a:t>The​‍​‌‍​‍‌ demand for an automated health risk detection system for elderly people is quite high. Studies have shown that sleep data is very informative regarding health conditions. In fact, health-risks have been associated with sleep-related data.</a:t>
-            </a:r>
+              <a:t>There is a growing need for automated health risk detection systems for elderly populations, as sleep data provides valuable indicators of cardiac, respiratory, and mental conditions. Manual PSG analysis is time-consuming, costly, and often unavailable in resource-limited regions, delaying early diagnosis. </a:t>
+            </a:r>
+          </a:p>
+          <a:p>
+            <a:pPr marL="0" indent="0">
+              <a:buNone/>
+            </a:pPr>
+            <a:endParaRPr lang="en-GB" dirty="0"/>
           </a:p>
           <a:p>
             <a:r>
               <a:rPr lang="en-GB" dirty="0"/>
-              <a:t>A manual PSG analysis requires a lot of time, is costly, and not available in less developed regions, resulting in a lack of early health risk detection for elderly populations.</a:t>
-            </a:r>
-          </a:p>
-          <a:p>
-            <a:r>
-              <a:rPr lang="en-GB" dirty="0"/>
-              <a:t>AI models available for PSG analysis today are very demanding in terms of computation and therefore cannot be deployed on low-end devices. This means that they are not suitable for practical implementation in the areas where they are needed the most.</a:t>
-            </a:r>
-          </a:p>
-          <a:p>
-            <a:r>
-              <a:rPr lang="en-GB" dirty="0"/>
-              <a:t>We need a light, highly efficient and accurate model for assessing cardiac, respiratory, and mental health risks, yet such a model should also be deployable in a limited healthcare ​‍​‌‍​‍‌setting.</a:t>
-            </a:r>
-          </a:p>
-          <a:p>
-            <a:endParaRPr lang="en-GB" dirty="0"/>
+              <a:t>Existing AI-based PSG models are computationally intensive and unsuitable for deployment on low-end devices. Therefore, there is a need for a lightweight, efficient, and accurate model that can operate in constrained healthcare settings.</a:t>
+            </a:r>
           </a:p>
         </p:txBody>
       </p:sp>

</xml_diff>